<commit_message>
Added website (not working, wip)
</commit_message>
<xml_diff>
--- a/Documentation/AkkaNetPizzaAvond.pptx
+++ b/Documentation/AkkaNetPizzaAvond.pptx
@@ -5,20 +5,28 @@
     <p:sldMasterId id="2147483648" r:id="rId1"/>
   </p:sldMasterIdLst>
   <p:notesMasterIdLst>
-    <p:notesMasterId r:id="rId5"/>
+    <p:notesMasterId r:id="rId13"/>
   </p:notesMasterIdLst>
   <p:handoutMasterIdLst>
-    <p:handoutMasterId r:id="rId6"/>
+    <p:handoutMasterId r:id="rId14"/>
   </p:handoutMasterIdLst>
   <p:sldIdLst>
     <p:sldId id="256" r:id="rId2"/>
     <p:sldId id="297" r:id="rId3"/>
-    <p:sldId id="279" r:id="rId4"/>
+    <p:sldId id="305" r:id="rId4"/>
+    <p:sldId id="298" r:id="rId5"/>
+    <p:sldId id="301" r:id="rId6"/>
+    <p:sldId id="300" r:id="rId7"/>
+    <p:sldId id="303" r:id="rId8"/>
+    <p:sldId id="304" r:id="rId9"/>
+    <p:sldId id="302" r:id="rId10"/>
+    <p:sldId id="299" r:id="rId11"/>
+    <p:sldId id="279" r:id="rId12"/>
   </p:sldIdLst>
   <p:sldSz cx="9144000" cy="5143500" type="screen16x9"/>
   <p:notesSz cx="6858000" cy="9144000"/>
   <p:custDataLst>
-    <p:tags r:id="rId7"/>
+    <p:tags r:id="rId15"/>
   </p:custDataLst>
   <p:defaultTextStyle>
     <a:defPPr>
@@ -122,6 +130,14 @@
           <p14:sldIdLst>
             <p14:sldId id="256"/>
             <p14:sldId id="297"/>
+            <p14:sldId id="305"/>
+            <p14:sldId id="298"/>
+            <p14:sldId id="301"/>
+            <p14:sldId id="300"/>
+            <p14:sldId id="303"/>
+            <p14:sldId id="304"/>
+            <p14:sldId id="302"/>
+            <p14:sldId id="299"/>
             <p14:sldId id="279"/>
           </p14:sldIdLst>
         </p14:section>
@@ -267,7 +283,7 @@
             <a:fld id="{11263177-940D-4B97-A051-92805C7C3152}" type="datetimeFigureOut">
               <a:rPr lang="en-US" smtClean="0"/>
               <a:pPr/>
-              <a:t>9/9/2017</a:t>
+              <a:t>9/11/2017</a:t>
             </a:fld>
             <a:endParaRPr lang="en-US"/>
           </a:p>
@@ -434,7 +450,7 @@
             <a:fld id="{F138B54E-4A02-452E-ADC8-FC4AE631CF37}" type="datetimeFigureOut">
               <a:rPr lang="en-US" smtClean="0"/>
               <a:pPr/>
-              <a:t>9/9/2017</a:t>
+              <a:t>9/11/2017</a:t>
             </a:fld>
             <a:endParaRPr lang="en-US"/>
           </a:p>
@@ -797,6 +813,91 @@
 </p:notes>
 </file>
 
+<file path=ppt/notesSlides/notesSlide10.xml><?xml version="1.0" encoding="utf-8"?>
+<p:notes xmlns:a="http://schemas.openxmlformats.org/drawingml/2006/main" xmlns:r="http://schemas.openxmlformats.org/officeDocument/2006/relationships" xmlns:p="http://schemas.openxmlformats.org/presentationml/2006/main">
+  <p:cSld>
+    <p:spTree>
+      <p:nvGrpSpPr>
+        <p:cNvPr id="1" name=""/>
+        <p:cNvGrpSpPr/>
+        <p:nvPr/>
+      </p:nvGrpSpPr>
+      <p:grpSpPr>
+        <a:xfrm>
+          <a:off x="0" y="0"/>
+          <a:ext cx="0" cy="0"/>
+          <a:chOff x="0" y="0"/>
+          <a:chExt cx="0" cy="0"/>
+        </a:xfrm>
+      </p:grpSpPr>
+      <p:sp>
+        <p:nvSpPr>
+          <p:cNvPr id="2" name="Slide Image Placeholder 1"/>
+          <p:cNvSpPr>
+            <a:spLocks noGrp="1" noRot="1" noChangeAspect="1"/>
+          </p:cNvSpPr>
+          <p:nvPr>
+            <p:ph type="sldImg"/>
+          </p:nvPr>
+        </p:nvSpPr>
+        <p:spPr/>
+      </p:sp>
+      <p:sp>
+        <p:nvSpPr>
+          <p:cNvPr id="3" name="Notes Placeholder 2"/>
+          <p:cNvSpPr>
+            <a:spLocks noGrp="1"/>
+          </p:cNvSpPr>
+          <p:nvPr>
+            <p:ph type="body" idx="1"/>
+          </p:nvPr>
+        </p:nvSpPr>
+        <p:spPr/>
+        <p:txBody>
+          <a:bodyPr/>
+          <a:lstStyle/>
+          <a:p>
+            <a:endParaRPr lang="nl-NL" dirty="0"/>
+          </a:p>
+        </p:txBody>
+      </p:sp>
+      <p:sp>
+        <p:nvSpPr>
+          <p:cNvPr id="4" name="Slide Number Placeholder 3"/>
+          <p:cNvSpPr>
+            <a:spLocks noGrp="1"/>
+          </p:cNvSpPr>
+          <p:nvPr>
+            <p:ph type="sldNum" sz="quarter" idx="10"/>
+          </p:nvPr>
+        </p:nvSpPr>
+        <p:spPr/>
+        <p:txBody>
+          <a:bodyPr/>
+          <a:lstStyle/>
+          <a:p>
+            <a:fld id="{E3A231E2-5917-44CD-8A06-5F2829B13D02}" type="slidenum">
+              <a:rPr lang="en-US" smtClean="0"/>
+              <a:pPr/>
+              <a:t>11</a:t>
+            </a:fld>
+            <a:endParaRPr lang="en-US"/>
+          </a:p>
+        </p:txBody>
+      </p:sp>
+    </p:spTree>
+    <p:extLst>
+      <p:ext uri="{BB962C8B-B14F-4D97-AF65-F5344CB8AC3E}">
+        <p14:creationId xmlns:p14="http://schemas.microsoft.com/office/powerpoint/2010/main" val="501368947"/>
+      </p:ext>
+    </p:extLst>
+  </p:cSld>
+  <p:clrMapOvr>
+    <a:masterClrMapping/>
+  </p:clrMapOvr>
+</p:notes>
+</file>
+
 <file path=ppt/notesSlides/notesSlide2.xml><?xml version="1.0" encoding="utf-8"?>
 <p:notes xmlns:a="http://schemas.openxmlformats.org/drawingml/2006/main" xmlns:r="http://schemas.openxmlformats.org/officeDocument/2006/relationships" xmlns:p="http://schemas.openxmlformats.org/presentationml/2006/main">
   <p:cSld>
@@ -872,7 +973,638 @@
     </p:spTree>
     <p:extLst>
       <p:ext uri="{BB962C8B-B14F-4D97-AF65-F5344CB8AC3E}">
-        <p14:creationId xmlns:p14="http://schemas.microsoft.com/office/powerpoint/2010/main" val="501368947"/>
+        <p14:creationId xmlns:p14="http://schemas.microsoft.com/office/powerpoint/2010/main" val="1320011979"/>
+      </p:ext>
+    </p:extLst>
+  </p:cSld>
+  <p:clrMapOvr>
+    <a:masterClrMapping/>
+  </p:clrMapOvr>
+</p:notes>
+</file>
+
+<file path=ppt/notesSlides/notesSlide3.xml><?xml version="1.0" encoding="utf-8"?>
+<p:notes xmlns:a="http://schemas.openxmlformats.org/drawingml/2006/main" xmlns:r="http://schemas.openxmlformats.org/officeDocument/2006/relationships" xmlns:p="http://schemas.openxmlformats.org/presentationml/2006/main">
+  <p:cSld>
+    <p:spTree>
+      <p:nvGrpSpPr>
+        <p:cNvPr id="1" name=""/>
+        <p:cNvGrpSpPr/>
+        <p:nvPr/>
+      </p:nvGrpSpPr>
+      <p:grpSpPr>
+        <a:xfrm>
+          <a:off x="0" y="0"/>
+          <a:ext cx="0" cy="0"/>
+          <a:chOff x="0" y="0"/>
+          <a:chExt cx="0" cy="0"/>
+        </a:xfrm>
+      </p:grpSpPr>
+      <p:sp>
+        <p:nvSpPr>
+          <p:cNvPr id="2" name="Slide Image Placeholder 1"/>
+          <p:cNvSpPr>
+            <a:spLocks noGrp="1" noRot="1" noChangeAspect="1"/>
+          </p:cNvSpPr>
+          <p:nvPr>
+            <p:ph type="sldImg"/>
+          </p:nvPr>
+        </p:nvSpPr>
+        <p:spPr/>
+      </p:sp>
+      <p:sp>
+        <p:nvSpPr>
+          <p:cNvPr id="3" name="Notes Placeholder 2"/>
+          <p:cNvSpPr>
+            <a:spLocks noGrp="1"/>
+          </p:cNvSpPr>
+          <p:nvPr>
+            <p:ph type="body" idx="1"/>
+          </p:nvPr>
+        </p:nvSpPr>
+        <p:spPr/>
+        <p:txBody>
+          <a:bodyPr/>
+          <a:lstStyle/>
+          <a:p>
+            <a:r>
+              <a:rPr lang="nl-NL" dirty="0" smtClean="0"/>
+              <a:t>Gedefinieerd</a:t>
+            </a:r>
+            <a:r>
+              <a:rPr lang="nl-NL" baseline="0" dirty="0" smtClean="0"/>
+              <a:t> in 1973 in een paper van Carl Hewitt, populairder gemaakt door Erlang voor concurrent, </a:t>
+            </a:r>
+            <a:r>
+              <a:rPr lang="nl-NL" baseline="0" dirty="0" err="1" smtClean="0"/>
+              <a:t>reliable</a:t>
+            </a:r>
+            <a:r>
+              <a:rPr lang="nl-NL" baseline="0" dirty="0" smtClean="0"/>
+              <a:t> telecom systemen</a:t>
+            </a:r>
+            <a:r>
+              <a:rPr lang="nl-NL" baseline="0" dirty="0" smtClean="0"/>
+              <a:t>. </a:t>
+            </a:r>
+            <a:r>
+              <a:rPr lang="nl-NL" baseline="0" dirty="0" err="1" smtClean="0"/>
+              <a:t>Lightweight</a:t>
+            </a:r>
+            <a:r>
+              <a:rPr lang="nl-NL" baseline="0" dirty="0" smtClean="0"/>
+              <a:t>, </a:t>
+            </a:r>
+            <a:r>
+              <a:rPr lang="nl-NL" baseline="0" dirty="0" err="1" smtClean="0"/>
+              <a:t>scale</a:t>
+            </a:r>
+            <a:r>
+              <a:rPr lang="nl-NL" baseline="0" dirty="0" smtClean="0"/>
+              <a:t> out</a:t>
+            </a:r>
+            <a:endParaRPr lang="nl-NL" dirty="0"/>
+          </a:p>
+        </p:txBody>
+      </p:sp>
+      <p:sp>
+        <p:nvSpPr>
+          <p:cNvPr id="4" name="Slide Number Placeholder 3"/>
+          <p:cNvSpPr>
+            <a:spLocks noGrp="1"/>
+          </p:cNvSpPr>
+          <p:nvPr>
+            <p:ph type="sldNum" sz="quarter" idx="10"/>
+          </p:nvPr>
+        </p:nvSpPr>
+        <p:spPr/>
+        <p:txBody>
+          <a:bodyPr/>
+          <a:lstStyle/>
+          <a:p>
+            <a:fld id="{E3A231E2-5917-44CD-8A06-5F2829B13D02}" type="slidenum">
+              <a:rPr lang="en-US" smtClean="0"/>
+              <a:pPr/>
+              <a:t>4</a:t>
+            </a:fld>
+            <a:endParaRPr lang="en-US"/>
+          </a:p>
+        </p:txBody>
+      </p:sp>
+    </p:spTree>
+    <p:extLst>
+      <p:ext uri="{BB962C8B-B14F-4D97-AF65-F5344CB8AC3E}">
+        <p14:creationId xmlns:p14="http://schemas.microsoft.com/office/powerpoint/2010/main" val="2170219130"/>
+      </p:ext>
+    </p:extLst>
+  </p:cSld>
+  <p:clrMapOvr>
+    <a:masterClrMapping/>
+  </p:clrMapOvr>
+</p:notes>
+</file>
+
+<file path=ppt/notesSlides/notesSlide4.xml><?xml version="1.0" encoding="utf-8"?>
+<p:notes xmlns:a="http://schemas.openxmlformats.org/drawingml/2006/main" xmlns:r="http://schemas.openxmlformats.org/officeDocument/2006/relationships" xmlns:p="http://schemas.openxmlformats.org/presentationml/2006/main">
+  <p:cSld>
+    <p:spTree>
+      <p:nvGrpSpPr>
+        <p:cNvPr id="1" name=""/>
+        <p:cNvGrpSpPr/>
+        <p:nvPr/>
+      </p:nvGrpSpPr>
+      <p:grpSpPr>
+        <a:xfrm>
+          <a:off x="0" y="0"/>
+          <a:ext cx="0" cy="0"/>
+          <a:chOff x="0" y="0"/>
+          <a:chExt cx="0" cy="0"/>
+        </a:xfrm>
+      </p:grpSpPr>
+      <p:sp>
+        <p:nvSpPr>
+          <p:cNvPr id="2" name="Slide Image Placeholder 1"/>
+          <p:cNvSpPr>
+            <a:spLocks noGrp="1" noRot="1" noChangeAspect="1"/>
+          </p:cNvSpPr>
+          <p:nvPr>
+            <p:ph type="sldImg"/>
+          </p:nvPr>
+        </p:nvSpPr>
+        <p:spPr/>
+      </p:sp>
+      <p:sp>
+        <p:nvSpPr>
+          <p:cNvPr id="3" name="Notes Placeholder 2"/>
+          <p:cNvSpPr>
+            <a:spLocks noGrp="1"/>
+          </p:cNvSpPr>
+          <p:nvPr>
+            <p:ph type="body" idx="1"/>
+          </p:nvPr>
+        </p:nvSpPr>
+        <p:spPr/>
+        <p:txBody>
+          <a:bodyPr/>
+          <a:lstStyle/>
+          <a:p>
+            <a:endParaRPr lang="nl-NL" dirty="0"/>
+          </a:p>
+        </p:txBody>
+      </p:sp>
+      <p:sp>
+        <p:nvSpPr>
+          <p:cNvPr id="4" name="Slide Number Placeholder 3"/>
+          <p:cNvSpPr>
+            <a:spLocks noGrp="1"/>
+          </p:cNvSpPr>
+          <p:nvPr>
+            <p:ph type="sldNum" sz="quarter" idx="10"/>
+          </p:nvPr>
+        </p:nvSpPr>
+        <p:spPr/>
+        <p:txBody>
+          <a:bodyPr/>
+          <a:lstStyle/>
+          <a:p>
+            <a:fld id="{E3A231E2-5917-44CD-8A06-5F2829B13D02}" type="slidenum">
+              <a:rPr lang="en-US" smtClean="0"/>
+              <a:pPr/>
+              <a:t>5</a:t>
+            </a:fld>
+            <a:endParaRPr lang="en-US"/>
+          </a:p>
+        </p:txBody>
+      </p:sp>
+    </p:spTree>
+    <p:extLst>
+      <p:ext uri="{BB962C8B-B14F-4D97-AF65-F5344CB8AC3E}">
+        <p14:creationId xmlns:p14="http://schemas.microsoft.com/office/powerpoint/2010/main" val="3456793281"/>
+      </p:ext>
+    </p:extLst>
+  </p:cSld>
+  <p:clrMapOvr>
+    <a:masterClrMapping/>
+  </p:clrMapOvr>
+</p:notes>
+</file>
+
+<file path=ppt/notesSlides/notesSlide5.xml><?xml version="1.0" encoding="utf-8"?>
+<p:notes xmlns:a="http://schemas.openxmlformats.org/drawingml/2006/main" xmlns:r="http://schemas.openxmlformats.org/officeDocument/2006/relationships" xmlns:p="http://schemas.openxmlformats.org/presentationml/2006/main">
+  <p:cSld>
+    <p:spTree>
+      <p:nvGrpSpPr>
+        <p:cNvPr id="1" name=""/>
+        <p:cNvGrpSpPr/>
+        <p:nvPr/>
+      </p:nvGrpSpPr>
+      <p:grpSpPr>
+        <a:xfrm>
+          <a:off x="0" y="0"/>
+          <a:ext cx="0" cy="0"/>
+          <a:chOff x="0" y="0"/>
+          <a:chExt cx="0" cy="0"/>
+        </a:xfrm>
+      </p:grpSpPr>
+      <p:sp>
+        <p:nvSpPr>
+          <p:cNvPr id="2" name="Slide Image Placeholder 1"/>
+          <p:cNvSpPr>
+            <a:spLocks noGrp="1" noRot="1" noChangeAspect="1"/>
+          </p:cNvSpPr>
+          <p:nvPr>
+            <p:ph type="sldImg"/>
+          </p:nvPr>
+        </p:nvSpPr>
+        <p:spPr/>
+      </p:sp>
+      <p:sp>
+        <p:nvSpPr>
+          <p:cNvPr id="3" name="Notes Placeholder 2"/>
+          <p:cNvSpPr>
+            <a:spLocks noGrp="1"/>
+          </p:cNvSpPr>
+          <p:nvPr>
+            <p:ph type="body" idx="1"/>
+          </p:nvPr>
+        </p:nvSpPr>
+        <p:spPr/>
+        <p:txBody>
+          <a:bodyPr/>
+          <a:lstStyle/>
+          <a:p>
+            <a:endParaRPr lang="nl-NL" dirty="0"/>
+          </a:p>
+        </p:txBody>
+      </p:sp>
+      <p:sp>
+        <p:nvSpPr>
+          <p:cNvPr id="4" name="Slide Number Placeholder 3"/>
+          <p:cNvSpPr>
+            <a:spLocks noGrp="1"/>
+          </p:cNvSpPr>
+          <p:nvPr>
+            <p:ph type="sldNum" sz="quarter" idx="10"/>
+          </p:nvPr>
+        </p:nvSpPr>
+        <p:spPr/>
+        <p:txBody>
+          <a:bodyPr/>
+          <a:lstStyle/>
+          <a:p>
+            <a:fld id="{E3A231E2-5917-44CD-8A06-5F2829B13D02}" type="slidenum">
+              <a:rPr lang="en-US" smtClean="0"/>
+              <a:pPr/>
+              <a:t>6</a:t>
+            </a:fld>
+            <a:endParaRPr lang="en-US"/>
+          </a:p>
+        </p:txBody>
+      </p:sp>
+    </p:spTree>
+    <p:extLst>
+      <p:ext uri="{BB962C8B-B14F-4D97-AF65-F5344CB8AC3E}">
+        <p14:creationId xmlns:p14="http://schemas.microsoft.com/office/powerpoint/2010/main" val="3977603576"/>
+      </p:ext>
+    </p:extLst>
+  </p:cSld>
+  <p:clrMapOvr>
+    <a:masterClrMapping/>
+  </p:clrMapOvr>
+</p:notes>
+</file>
+
+<file path=ppt/notesSlides/notesSlide6.xml><?xml version="1.0" encoding="utf-8"?>
+<p:notes xmlns:a="http://schemas.openxmlformats.org/drawingml/2006/main" xmlns:r="http://schemas.openxmlformats.org/officeDocument/2006/relationships" xmlns:p="http://schemas.openxmlformats.org/presentationml/2006/main">
+  <p:cSld>
+    <p:spTree>
+      <p:nvGrpSpPr>
+        <p:cNvPr id="1" name=""/>
+        <p:cNvGrpSpPr/>
+        <p:nvPr/>
+      </p:nvGrpSpPr>
+      <p:grpSpPr>
+        <a:xfrm>
+          <a:off x="0" y="0"/>
+          <a:ext cx="0" cy="0"/>
+          <a:chOff x="0" y="0"/>
+          <a:chExt cx="0" cy="0"/>
+        </a:xfrm>
+      </p:grpSpPr>
+      <p:sp>
+        <p:nvSpPr>
+          <p:cNvPr id="2" name="Slide Image Placeholder 1"/>
+          <p:cNvSpPr>
+            <a:spLocks noGrp="1" noRot="1" noChangeAspect="1"/>
+          </p:cNvSpPr>
+          <p:nvPr>
+            <p:ph type="sldImg"/>
+          </p:nvPr>
+        </p:nvSpPr>
+        <p:spPr/>
+      </p:sp>
+      <p:sp>
+        <p:nvSpPr>
+          <p:cNvPr id="3" name="Notes Placeholder 2"/>
+          <p:cNvSpPr>
+            <a:spLocks noGrp="1"/>
+          </p:cNvSpPr>
+          <p:nvPr>
+            <p:ph type="body" idx="1"/>
+          </p:nvPr>
+        </p:nvSpPr>
+        <p:spPr/>
+        <p:txBody>
+          <a:bodyPr/>
+          <a:lstStyle/>
+          <a:p>
+            <a:endParaRPr lang="nl-NL" dirty="0"/>
+          </a:p>
+        </p:txBody>
+      </p:sp>
+      <p:sp>
+        <p:nvSpPr>
+          <p:cNvPr id="4" name="Slide Number Placeholder 3"/>
+          <p:cNvSpPr>
+            <a:spLocks noGrp="1"/>
+          </p:cNvSpPr>
+          <p:nvPr>
+            <p:ph type="sldNum" sz="quarter" idx="10"/>
+          </p:nvPr>
+        </p:nvSpPr>
+        <p:spPr/>
+        <p:txBody>
+          <a:bodyPr/>
+          <a:lstStyle/>
+          <a:p>
+            <a:fld id="{E3A231E2-5917-44CD-8A06-5F2829B13D02}" type="slidenum">
+              <a:rPr lang="en-US" smtClean="0"/>
+              <a:pPr/>
+              <a:t>7</a:t>
+            </a:fld>
+            <a:endParaRPr lang="en-US"/>
+          </a:p>
+        </p:txBody>
+      </p:sp>
+    </p:spTree>
+    <p:extLst>
+      <p:ext uri="{BB962C8B-B14F-4D97-AF65-F5344CB8AC3E}">
+        <p14:creationId xmlns:p14="http://schemas.microsoft.com/office/powerpoint/2010/main" val="1237886955"/>
+      </p:ext>
+    </p:extLst>
+  </p:cSld>
+  <p:clrMapOvr>
+    <a:masterClrMapping/>
+  </p:clrMapOvr>
+</p:notes>
+</file>
+
+<file path=ppt/notesSlides/notesSlide7.xml><?xml version="1.0" encoding="utf-8"?>
+<p:notes xmlns:a="http://schemas.openxmlformats.org/drawingml/2006/main" xmlns:r="http://schemas.openxmlformats.org/officeDocument/2006/relationships" xmlns:p="http://schemas.openxmlformats.org/presentationml/2006/main">
+  <p:cSld>
+    <p:spTree>
+      <p:nvGrpSpPr>
+        <p:cNvPr id="1" name=""/>
+        <p:cNvGrpSpPr/>
+        <p:nvPr/>
+      </p:nvGrpSpPr>
+      <p:grpSpPr>
+        <a:xfrm>
+          <a:off x="0" y="0"/>
+          <a:ext cx="0" cy="0"/>
+          <a:chOff x="0" y="0"/>
+          <a:chExt cx="0" cy="0"/>
+        </a:xfrm>
+      </p:grpSpPr>
+      <p:sp>
+        <p:nvSpPr>
+          <p:cNvPr id="2" name="Slide Image Placeholder 1"/>
+          <p:cNvSpPr>
+            <a:spLocks noGrp="1" noRot="1" noChangeAspect="1"/>
+          </p:cNvSpPr>
+          <p:nvPr>
+            <p:ph type="sldImg"/>
+          </p:nvPr>
+        </p:nvSpPr>
+        <p:spPr/>
+      </p:sp>
+      <p:sp>
+        <p:nvSpPr>
+          <p:cNvPr id="3" name="Notes Placeholder 2"/>
+          <p:cNvSpPr>
+            <a:spLocks noGrp="1"/>
+          </p:cNvSpPr>
+          <p:nvPr>
+            <p:ph type="body" idx="1"/>
+          </p:nvPr>
+        </p:nvSpPr>
+        <p:spPr/>
+        <p:txBody>
+          <a:bodyPr/>
+          <a:lstStyle/>
+          <a:p>
+            <a:endParaRPr lang="nl-NL" dirty="0"/>
+          </a:p>
+        </p:txBody>
+      </p:sp>
+      <p:sp>
+        <p:nvSpPr>
+          <p:cNvPr id="4" name="Slide Number Placeholder 3"/>
+          <p:cNvSpPr>
+            <a:spLocks noGrp="1"/>
+          </p:cNvSpPr>
+          <p:nvPr>
+            <p:ph type="sldNum" sz="quarter" idx="10"/>
+          </p:nvPr>
+        </p:nvSpPr>
+        <p:spPr/>
+        <p:txBody>
+          <a:bodyPr/>
+          <a:lstStyle/>
+          <a:p>
+            <a:fld id="{E3A231E2-5917-44CD-8A06-5F2829B13D02}" type="slidenum">
+              <a:rPr lang="en-US" smtClean="0"/>
+              <a:pPr/>
+              <a:t>8</a:t>
+            </a:fld>
+            <a:endParaRPr lang="en-US"/>
+          </a:p>
+        </p:txBody>
+      </p:sp>
+    </p:spTree>
+    <p:extLst>
+      <p:ext uri="{BB962C8B-B14F-4D97-AF65-F5344CB8AC3E}">
+        <p14:creationId xmlns:p14="http://schemas.microsoft.com/office/powerpoint/2010/main" val="3901147341"/>
+      </p:ext>
+    </p:extLst>
+  </p:cSld>
+  <p:clrMapOvr>
+    <a:masterClrMapping/>
+  </p:clrMapOvr>
+</p:notes>
+</file>
+
+<file path=ppt/notesSlides/notesSlide8.xml><?xml version="1.0" encoding="utf-8"?>
+<p:notes xmlns:a="http://schemas.openxmlformats.org/drawingml/2006/main" xmlns:r="http://schemas.openxmlformats.org/officeDocument/2006/relationships" xmlns:p="http://schemas.openxmlformats.org/presentationml/2006/main">
+  <p:cSld>
+    <p:spTree>
+      <p:nvGrpSpPr>
+        <p:cNvPr id="1" name=""/>
+        <p:cNvGrpSpPr/>
+        <p:nvPr/>
+      </p:nvGrpSpPr>
+      <p:grpSpPr>
+        <a:xfrm>
+          <a:off x="0" y="0"/>
+          <a:ext cx="0" cy="0"/>
+          <a:chOff x="0" y="0"/>
+          <a:chExt cx="0" cy="0"/>
+        </a:xfrm>
+      </p:grpSpPr>
+      <p:sp>
+        <p:nvSpPr>
+          <p:cNvPr id="2" name="Slide Image Placeholder 1"/>
+          <p:cNvSpPr>
+            <a:spLocks noGrp="1" noRot="1" noChangeAspect="1"/>
+          </p:cNvSpPr>
+          <p:nvPr>
+            <p:ph type="sldImg"/>
+          </p:nvPr>
+        </p:nvSpPr>
+        <p:spPr/>
+      </p:sp>
+      <p:sp>
+        <p:nvSpPr>
+          <p:cNvPr id="3" name="Notes Placeholder 2"/>
+          <p:cNvSpPr>
+            <a:spLocks noGrp="1"/>
+          </p:cNvSpPr>
+          <p:nvPr>
+            <p:ph type="body" idx="1"/>
+          </p:nvPr>
+        </p:nvSpPr>
+        <p:spPr/>
+        <p:txBody>
+          <a:bodyPr/>
+          <a:lstStyle/>
+          <a:p>
+            <a:endParaRPr lang="nl-NL" dirty="0"/>
+          </a:p>
+        </p:txBody>
+      </p:sp>
+      <p:sp>
+        <p:nvSpPr>
+          <p:cNvPr id="4" name="Slide Number Placeholder 3"/>
+          <p:cNvSpPr>
+            <a:spLocks noGrp="1"/>
+          </p:cNvSpPr>
+          <p:nvPr>
+            <p:ph type="sldNum" sz="quarter" idx="10"/>
+          </p:nvPr>
+        </p:nvSpPr>
+        <p:spPr/>
+        <p:txBody>
+          <a:bodyPr/>
+          <a:lstStyle/>
+          <a:p>
+            <a:fld id="{E3A231E2-5917-44CD-8A06-5F2829B13D02}" type="slidenum">
+              <a:rPr lang="en-US" smtClean="0"/>
+              <a:pPr/>
+              <a:t>9</a:t>
+            </a:fld>
+            <a:endParaRPr lang="en-US"/>
+          </a:p>
+        </p:txBody>
+      </p:sp>
+    </p:spTree>
+    <p:extLst>
+      <p:ext uri="{BB962C8B-B14F-4D97-AF65-F5344CB8AC3E}">
+        <p14:creationId xmlns:p14="http://schemas.microsoft.com/office/powerpoint/2010/main" val="2724728381"/>
+      </p:ext>
+    </p:extLst>
+  </p:cSld>
+  <p:clrMapOvr>
+    <a:masterClrMapping/>
+  </p:clrMapOvr>
+</p:notes>
+</file>
+
+<file path=ppt/notesSlides/notesSlide9.xml><?xml version="1.0" encoding="utf-8"?>
+<p:notes xmlns:a="http://schemas.openxmlformats.org/drawingml/2006/main" xmlns:r="http://schemas.openxmlformats.org/officeDocument/2006/relationships" xmlns:p="http://schemas.openxmlformats.org/presentationml/2006/main">
+  <p:cSld>
+    <p:spTree>
+      <p:nvGrpSpPr>
+        <p:cNvPr id="1" name=""/>
+        <p:cNvGrpSpPr/>
+        <p:nvPr/>
+      </p:nvGrpSpPr>
+      <p:grpSpPr>
+        <a:xfrm>
+          <a:off x="0" y="0"/>
+          <a:ext cx="0" cy="0"/>
+          <a:chOff x="0" y="0"/>
+          <a:chExt cx="0" cy="0"/>
+        </a:xfrm>
+      </p:grpSpPr>
+      <p:sp>
+        <p:nvSpPr>
+          <p:cNvPr id="2" name="Slide Image Placeholder 1"/>
+          <p:cNvSpPr>
+            <a:spLocks noGrp="1" noRot="1" noChangeAspect="1"/>
+          </p:cNvSpPr>
+          <p:nvPr>
+            <p:ph type="sldImg"/>
+          </p:nvPr>
+        </p:nvSpPr>
+        <p:spPr/>
+      </p:sp>
+      <p:sp>
+        <p:nvSpPr>
+          <p:cNvPr id="3" name="Notes Placeholder 2"/>
+          <p:cNvSpPr>
+            <a:spLocks noGrp="1"/>
+          </p:cNvSpPr>
+          <p:nvPr>
+            <p:ph type="body" idx="1"/>
+          </p:nvPr>
+        </p:nvSpPr>
+        <p:spPr/>
+        <p:txBody>
+          <a:bodyPr/>
+          <a:lstStyle/>
+          <a:p>
+            <a:endParaRPr lang="nl-NL" dirty="0"/>
+          </a:p>
+        </p:txBody>
+      </p:sp>
+      <p:sp>
+        <p:nvSpPr>
+          <p:cNvPr id="4" name="Slide Number Placeholder 3"/>
+          <p:cNvSpPr>
+            <a:spLocks noGrp="1"/>
+          </p:cNvSpPr>
+          <p:nvPr>
+            <p:ph type="sldNum" sz="quarter" idx="10"/>
+          </p:nvPr>
+        </p:nvSpPr>
+        <p:spPr/>
+        <p:txBody>
+          <a:bodyPr/>
+          <a:lstStyle/>
+          <a:p>
+            <a:fld id="{E3A231E2-5917-44CD-8A06-5F2829B13D02}" type="slidenum">
+              <a:rPr lang="en-US" smtClean="0"/>
+              <a:pPr/>
+              <a:t>10</a:t>
+            </a:fld>
+            <a:endParaRPr lang="en-US"/>
+          </a:p>
+        </p:txBody>
+      </p:sp>
+    </p:spTree>
+    <p:extLst>
+      <p:ext uri="{BB962C8B-B14F-4D97-AF65-F5344CB8AC3E}">
+        <p14:creationId xmlns:p14="http://schemas.microsoft.com/office/powerpoint/2010/main" val="1006490952"/>
       </p:ext>
     </p:extLst>
   </p:cSld>
@@ -9074,6 +9806,38 @@
           </a:prstGeom>
         </p:spPr>
       </p:pic>
+      <p:sp>
+        <p:nvSpPr>
+          <p:cNvPr id="3" name="Rectangle 2"/>
+          <p:cNvSpPr/>
+          <p:nvPr/>
+        </p:nvSpPr>
+        <p:spPr>
+          <a:xfrm>
+            <a:off x="265781" y="3488488"/>
+            <a:ext cx="6040892" cy="369332"/>
+          </a:xfrm>
+          <a:prstGeom prst="rect">
+            <a:avLst/>
+          </a:prstGeom>
+        </p:spPr>
+        <p:txBody>
+          <a:bodyPr wrap="square">
+            <a:spAutoFit/>
+          </a:bodyPr>
+          <a:lstStyle/>
+          <a:p>
+            <a:r>
+              <a:rPr lang="nl-NL" b="1" dirty="0">
+                <a:solidFill>
+                  <a:schemeClr val="bg1"/>
+                </a:solidFill>
+              </a:rPr>
+              <a:t>https://github.com/KeesDijk/AkkaNetPizzaSession</a:t>
+            </a:r>
+          </a:p>
+        </p:txBody>
+      </p:sp>
     </p:spTree>
     <p:extLst>
       <p:ext uri="{BB962C8B-B14F-4D97-AF65-F5344CB8AC3E}">
@@ -9084,10 +9848,17 @@
   <p:clrMapOvr>
     <a:masterClrMapping/>
   </p:clrMapOvr>
+  <p:timing>
+    <p:tnLst>
+      <p:par>
+        <p:cTn id="1" dur="indefinite" restart="never" nodeType="tmRoot"/>
+      </p:par>
+    </p:tnLst>
+  </p:timing>
 </p:sld>
 </file>
 
-<file path=ppt/slides/slide2.xml><?xml version="1.0" encoding="utf-8"?>
+<file path=ppt/slides/slide10.xml><?xml version="1.0" encoding="utf-8"?>
 <p:sld xmlns:a="http://schemas.openxmlformats.org/drawingml/2006/main" xmlns:r="http://schemas.openxmlformats.org/officeDocument/2006/relationships" xmlns:p="http://schemas.openxmlformats.org/presentationml/2006/main">
   <p:cSld>
     <p:spTree>
@@ -9122,7 +9893,7 @@
             <a:fld id="{4EACBA47-91FC-4F0F-98EF-AF8B449ABA17}" type="slidenum">
               <a:rPr lang="nl-NL" noProof="0" smtClean="0"/>
               <a:pPr/>
-              <a:t>2</a:t>
+              <a:t>10</a:t>
             </a:fld>
             <a:endParaRPr lang="nl-NL" noProof="0" dirty="0"/>
           </a:p>
@@ -9140,7 +9911,7 @@
         </p:nvSpPr>
         <p:spPr>
           <a:xfrm>
-            <a:off x="1884624" y="4692511"/>
+            <a:off x="1884624" y="4618555"/>
             <a:ext cx="6621144" cy="192360"/>
           </a:xfrm>
         </p:spPr>
@@ -9156,7 +9927,6 @@
               <a:rPr lang="nl-NL" dirty="0"/>
               <a:t> Pizza Sessie</a:t>
             </a:r>
-            <a:endParaRPr lang="nl-NL" dirty="0"/>
           </a:p>
         </p:txBody>
       </p:sp>
@@ -9181,9 +9951,406 @@
           <a:lstStyle/>
           <a:p>
             <a:r>
+              <a:rPr lang="nl-NL" dirty="0" err="1" smtClean="0"/>
+              <a:t>Akka.Net</a:t>
+            </a:r>
+            <a:r>
               <a:rPr lang="nl-NL" dirty="0" smtClean="0"/>
-              <a:t>Introductie</a:t>
-            </a:r>
+              <a:t> </a:t>
+            </a:r>
+            <a:r>
+              <a:rPr lang="nl-NL" dirty="0" err="1" smtClean="0"/>
+              <a:t>vs</a:t>
+            </a:r>
+            <a:r>
+              <a:rPr lang="nl-NL" dirty="0" smtClean="0"/>
+              <a:t> Service </a:t>
+            </a:r>
+            <a:r>
+              <a:rPr lang="nl-NL" dirty="0" err="1" smtClean="0"/>
+              <a:t>Fabric</a:t>
+            </a:r>
+            <a:endParaRPr lang="nl-NL" dirty="0"/>
+          </a:p>
+        </p:txBody>
+      </p:sp>
+      <p:sp>
+        <p:nvSpPr>
+          <p:cNvPr id="5" name="Content Placeholder 2"/>
+          <p:cNvSpPr txBox="1">
+            <a:spLocks/>
+          </p:cNvSpPr>
+          <p:nvPr/>
+        </p:nvSpPr>
+        <p:spPr>
+          <a:xfrm>
+            <a:off x="246228" y="1122560"/>
+            <a:ext cx="10058400" cy="3308246"/>
+          </a:xfrm>
+          <a:prstGeom prst="rect">
+            <a:avLst/>
+          </a:prstGeom>
+        </p:spPr>
+        <p:txBody>
+          <a:bodyPr>
+            <a:normAutofit/>
+          </a:bodyPr>
+          <a:lstStyle>
+            <a:lvl1pPr marL="351000" indent="-351000" algn="l" defTabSz="685800" rtl="0" eaLnBrk="1" latinLnBrk="0" hangingPunct="1">
+              <a:lnSpc>
+                <a:spcPts val="2000"/>
+              </a:lnSpc>
+              <a:spcBef>
+                <a:spcPts val="0"/>
+              </a:spcBef>
+              <a:buFont typeface="Wingdings 3" pitchFamily="18" charset="2"/>
+              <a:buChar char=""/>
+              <a:tabLst/>
+              <a:defRPr sz="1800" b="1" kern="1200">
+                <a:solidFill>
+                  <a:schemeClr val="tx1"/>
+                </a:solidFill>
+                <a:latin typeface="+mn-lt"/>
+                <a:ea typeface="+mn-ea"/>
+                <a:cs typeface="+mn-cs"/>
+              </a:defRPr>
+            </a:lvl1pPr>
+            <a:lvl2pPr marL="675000" indent="-350044" algn="l" defTabSz="740569" rtl="0" eaLnBrk="1" latinLnBrk="0" hangingPunct="1">
+              <a:lnSpc>
+                <a:spcPts val="2000"/>
+              </a:lnSpc>
+              <a:spcBef>
+                <a:spcPts val="0"/>
+              </a:spcBef>
+              <a:buFont typeface="Wingdings 3" pitchFamily="18" charset="2"/>
+              <a:buChar char=""/>
+              <a:tabLst/>
+              <a:defRPr sz="1800" b="1" kern="1200">
+                <a:solidFill>
+                  <a:schemeClr val="tx1"/>
+                </a:solidFill>
+                <a:latin typeface="+mn-lt"/>
+                <a:ea typeface="+mn-ea"/>
+                <a:cs typeface="+mn-cs"/>
+              </a:defRPr>
+            </a:lvl2pPr>
+            <a:lvl3pPr marL="1010841" indent="-350044" algn="l" defTabSz="740569" rtl="0" eaLnBrk="1" latinLnBrk="0" hangingPunct="1">
+              <a:lnSpc>
+                <a:spcPts val="2000"/>
+              </a:lnSpc>
+              <a:spcBef>
+                <a:spcPts val="0"/>
+              </a:spcBef>
+              <a:buFont typeface="Century Gothic" pitchFamily="34" charset="0"/>
+              <a:buChar char="•"/>
+              <a:tabLst/>
+              <a:defRPr sz="1800" b="1" kern="1200">
+                <a:solidFill>
+                  <a:schemeClr val="tx1"/>
+                </a:solidFill>
+                <a:latin typeface="+mn-lt"/>
+                <a:ea typeface="+mn-ea"/>
+                <a:cs typeface="+mn-cs"/>
+              </a:defRPr>
+            </a:lvl3pPr>
+            <a:lvl4pPr marL="1345406" indent="-350044" algn="l" defTabSz="685800" rtl="0" eaLnBrk="1" latinLnBrk="0" hangingPunct="1">
+              <a:lnSpc>
+                <a:spcPts val="1800"/>
+              </a:lnSpc>
+              <a:spcBef>
+                <a:spcPts val="0"/>
+              </a:spcBef>
+              <a:buFont typeface="Century Gothic" pitchFamily="34" charset="0"/>
+              <a:buChar char="•"/>
+              <a:defRPr sz="1400" b="1" kern="1200">
+                <a:solidFill>
+                  <a:schemeClr val="tx1"/>
+                </a:solidFill>
+                <a:latin typeface="+mn-lt"/>
+                <a:ea typeface="+mn-ea"/>
+                <a:cs typeface="+mn-cs"/>
+              </a:defRPr>
+            </a:lvl4pPr>
+            <a:lvl5pPr marL="1687116" indent="-350044" algn="l" defTabSz="501254" rtl="0" eaLnBrk="1" latinLnBrk="0" hangingPunct="1">
+              <a:lnSpc>
+                <a:spcPts val="1800"/>
+              </a:lnSpc>
+              <a:spcBef>
+                <a:spcPts val="0"/>
+              </a:spcBef>
+              <a:buFont typeface="Century Gothic" pitchFamily="34" charset="0"/>
+              <a:buChar char="•"/>
+              <a:defRPr sz="1400" b="1" kern="1200">
+                <a:solidFill>
+                  <a:schemeClr val="tx1"/>
+                </a:solidFill>
+                <a:latin typeface="+mn-lt"/>
+                <a:ea typeface="+mn-ea"/>
+                <a:cs typeface="+mn-cs"/>
+              </a:defRPr>
+            </a:lvl5pPr>
+            <a:lvl6pPr marL="1885950" indent="-171450" algn="l" defTabSz="685800" rtl="0" eaLnBrk="1" latinLnBrk="0" hangingPunct="1">
+              <a:spcBef>
+                <a:spcPct val="20000"/>
+              </a:spcBef>
+              <a:buFont typeface="Arial" pitchFamily="34" charset="0"/>
+              <a:buChar char="•"/>
+              <a:defRPr sz="1500" kern="1200">
+                <a:solidFill>
+                  <a:schemeClr val="tx1"/>
+                </a:solidFill>
+                <a:latin typeface="+mn-lt"/>
+                <a:ea typeface="+mn-ea"/>
+                <a:cs typeface="+mn-cs"/>
+              </a:defRPr>
+            </a:lvl6pPr>
+            <a:lvl7pPr marL="2228850" indent="-171450" algn="l" defTabSz="685800" rtl="0" eaLnBrk="1" latinLnBrk="0" hangingPunct="1">
+              <a:spcBef>
+                <a:spcPct val="20000"/>
+              </a:spcBef>
+              <a:buFont typeface="Arial" pitchFamily="34" charset="0"/>
+              <a:buChar char="•"/>
+              <a:defRPr sz="1500" kern="1200">
+                <a:solidFill>
+                  <a:schemeClr val="tx1"/>
+                </a:solidFill>
+                <a:latin typeface="+mn-lt"/>
+                <a:ea typeface="+mn-ea"/>
+                <a:cs typeface="+mn-cs"/>
+              </a:defRPr>
+            </a:lvl7pPr>
+            <a:lvl8pPr marL="2571750" indent="-171450" algn="l" defTabSz="685800" rtl="0" eaLnBrk="1" latinLnBrk="0" hangingPunct="1">
+              <a:spcBef>
+                <a:spcPct val="20000"/>
+              </a:spcBef>
+              <a:buFont typeface="Arial" pitchFamily="34" charset="0"/>
+              <a:buChar char="•"/>
+              <a:defRPr sz="1500" kern="1200">
+                <a:solidFill>
+                  <a:schemeClr val="tx1"/>
+                </a:solidFill>
+                <a:latin typeface="+mn-lt"/>
+                <a:ea typeface="+mn-ea"/>
+                <a:cs typeface="+mn-cs"/>
+              </a:defRPr>
+            </a:lvl8pPr>
+            <a:lvl9pPr marL="2914650" indent="-171450" algn="l" defTabSz="685800" rtl="0" eaLnBrk="1" latinLnBrk="0" hangingPunct="1">
+              <a:spcBef>
+                <a:spcPct val="20000"/>
+              </a:spcBef>
+              <a:buFont typeface="Arial" pitchFamily="34" charset="0"/>
+              <a:buChar char="•"/>
+              <a:defRPr sz="1500" kern="1200">
+                <a:solidFill>
+                  <a:schemeClr val="tx1"/>
+                </a:solidFill>
+                <a:latin typeface="+mn-lt"/>
+                <a:ea typeface="+mn-ea"/>
+                <a:cs typeface="+mn-cs"/>
+              </a:defRPr>
+            </a:lvl9pPr>
+          </a:lstStyle>
+          <a:p>
+            <a:pPr>
+              <a:lnSpc>
+                <a:spcPct val="100000"/>
+              </a:lnSpc>
+              <a:buFont typeface="Wingdings" panose="05000000000000000000" pitchFamily="2" charset="2"/>
+              <a:buChar char="Ø"/>
+            </a:pPr>
+            <a:r>
+              <a:rPr lang="nl-NL" dirty="0" smtClean="0"/>
+              <a:t>State in </a:t>
+            </a:r>
+            <a:r>
+              <a:rPr lang="nl-NL" dirty="0" err="1" smtClean="0"/>
+              <a:t>Akka.Net</a:t>
+            </a:r>
+            <a:r>
+              <a:rPr lang="nl-NL" dirty="0" smtClean="0"/>
+              <a:t> bij default niet bewaard, je hebt </a:t>
+            </a:r>
+            <a:r>
+              <a:rPr lang="nl-NL" dirty="0" err="1" smtClean="0"/>
+              <a:t>Akka.Persistance</a:t>
+            </a:r>
+            <a:r>
+              <a:rPr lang="nl-NL" dirty="0" smtClean="0"/>
+              <a:t> </a:t>
+            </a:r>
+          </a:p>
+          <a:p>
+            <a:pPr marL="324956" lvl="1" indent="0">
+              <a:lnSpc>
+                <a:spcPct val="100000"/>
+              </a:lnSpc>
+              <a:buNone/>
+            </a:pPr>
+            <a:r>
+              <a:rPr lang="nl-NL" dirty="0" smtClean="0"/>
+              <a:t>en code nodig</a:t>
+            </a:r>
+          </a:p>
+          <a:p>
+            <a:pPr>
+              <a:lnSpc>
+                <a:spcPct val="100000"/>
+              </a:lnSpc>
+              <a:buFont typeface="Wingdings" panose="05000000000000000000" pitchFamily="2" charset="2"/>
+              <a:buChar char="Ø"/>
+            </a:pPr>
+            <a:r>
+              <a:rPr lang="nl-NL" dirty="0" err="1" smtClean="0"/>
+              <a:t>Request</a:t>
+            </a:r>
+            <a:r>
+              <a:rPr lang="nl-NL" dirty="0" smtClean="0"/>
+              <a:t>-response workflow is anders.</a:t>
+            </a:r>
+            <a:endParaRPr lang="nl-NL" dirty="0"/>
+          </a:p>
+          <a:p>
+            <a:pPr>
+              <a:lnSpc>
+                <a:spcPct val="100000"/>
+              </a:lnSpc>
+              <a:buFont typeface="Wingdings" panose="05000000000000000000" pitchFamily="2" charset="2"/>
+              <a:buChar char="Ø"/>
+            </a:pPr>
+            <a:r>
+              <a:rPr lang="nl-NL" dirty="0" err="1" smtClean="0"/>
+              <a:t>Akka.Net</a:t>
+            </a:r>
+            <a:r>
+              <a:rPr lang="nl-NL" dirty="0" smtClean="0"/>
+              <a:t> gebruikt </a:t>
+            </a:r>
+            <a:r>
+              <a:rPr lang="nl-NL" dirty="0" err="1" smtClean="0"/>
+              <a:t>immutable</a:t>
+            </a:r>
+            <a:r>
+              <a:rPr lang="nl-NL" dirty="0" smtClean="0"/>
+              <a:t> </a:t>
+            </a:r>
+            <a:r>
+              <a:rPr lang="nl-NL" dirty="0" err="1" smtClean="0"/>
+              <a:t>messages</a:t>
+            </a:r>
+            <a:r>
+              <a:rPr lang="nl-NL" dirty="0" smtClean="0"/>
+              <a:t>.</a:t>
+            </a:r>
+          </a:p>
+          <a:p>
+            <a:pPr>
+              <a:lnSpc>
+                <a:spcPct val="100000"/>
+              </a:lnSpc>
+              <a:buFont typeface="Wingdings" panose="05000000000000000000" pitchFamily="2" charset="2"/>
+              <a:buChar char="Ø"/>
+            </a:pPr>
+            <a:r>
+              <a:rPr lang="nl-NL" dirty="0" smtClean="0"/>
+              <a:t>Actor </a:t>
+            </a:r>
+            <a:r>
+              <a:rPr lang="nl-NL" dirty="0" err="1" smtClean="0"/>
+              <a:t>selection</a:t>
+            </a:r>
+            <a:r>
+              <a:rPr lang="nl-NL" dirty="0" smtClean="0"/>
+              <a:t>\</a:t>
+            </a:r>
+            <a:r>
+              <a:rPr lang="nl-NL" dirty="0" err="1" smtClean="0"/>
+              <a:t>creation</a:t>
+            </a:r>
+            <a:r>
+              <a:rPr lang="nl-NL" dirty="0" smtClean="0"/>
+              <a:t> is anders</a:t>
+            </a:r>
+          </a:p>
+          <a:p>
+            <a:pPr marL="0" indent="0">
+              <a:lnSpc>
+                <a:spcPct val="100000"/>
+              </a:lnSpc>
+              <a:buNone/>
+            </a:pPr>
+            <a:endParaRPr lang="nl-NL" dirty="0" smtClean="0"/>
+          </a:p>
+          <a:p>
+            <a:pPr marL="0" indent="0">
+              <a:lnSpc>
+                <a:spcPct val="100000"/>
+              </a:lnSpc>
+              <a:buNone/>
+            </a:pPr>
+            <a:endParaRPr lang="nl-NL" dirty="0"/>
+          </a:p>
+          <a:p>
+            <a:pPr marL="0" indent="0">
+              <a:lnSpc>
+                <a:spcPct val="100000"/>
+              </a:lnSpc>
+              <a:buNone/>
+            </a:pPr>
+            <a:r>
+              <a:rPr lang="nl-NL" dirty="0">
+                <a:hlinkClick r:id="rId3"/>
+              </a:rPr>
+              <a:t>https://mikhail.io/2016/02/akka-net-style-actors-in-service-fabric</a:t>
+            </a:r>
+            <a:r>
+              <a:rPr lang="nl-NL" dirty="0" smtClean="0">
+                <a:hlinkClick r:id="rId3"/>
+              </a:rPr>
+              <a:t>/</a:t>
+            </a:r>
+            <a:endParaRPr lang="nl-NL" dirty="0" smtClean="0"/>
+          </a:p>
+          <a:p>
+            <a:pPr marL="0" indent="0">
+              <a:lnSpc>
+                <a:spcPct val="100000"/>
+              </a:lnSpc>
+              <a:buNone/>
+            </a:pPr>
+            <a:endParaRPr lang="nl-NL" dirty="0" smtClean="0"/>
+          </a:p>
+          <a:p>
+            <a:pPr marL="0" indent="0">
+              <a:lnSpc>
+                <a:spcPct val="100000"/>
+              </a:lnSpc>
+              <a:buNone/>
+            </a:pPr>
+            <a:r>
+              <a:rPr lang="nl-NL" dirty="0">
+                <a:hlinkClick r:id="rId4"/>
+              </a:rPr>
+              <a:t>https://</a:t>
+            </a:r>
+            <a:r>
+              <a:rPr lang="nl-NL" dirty="0" smtClean="0">
+                <a:hlinkClick r:id="rId4"/>
+              </a:rPr>
+              <a:t>channel9.msdn.com/Events/Azure-Day-Poland/AzureDay-North-Poland-2016/Running-AkkaNET-Cluster-on-Service-Fabric</a:t>
+            </a:r>
+            <a:r>
+              <a:rPr lang="nl-NL" dirty="0" smtClean="0"/>
+              <a:t> </a:t>
+            </a:r>
+            <a:endParaRPr lang="nl-NL" dirty="0"/>
+          </a:p>
+          <a:p>
+            <a:pPr marL="0" indent="0">
+              <a:lnSpc>
+                <a:spcPct val="100000"/>
+              </a:lnSpc>
+              <a:buNone/>
+            </a:pPr>
             <a:endParaRPr lang="nl-NL" dirty="0"/>
           </a:p>
         </p:txBody>
@@ -9191,17 +10358,24 @@
     </p:spTree>
     <p:extLst>
       <p:ext uri="{BB962C8B-B14F-4D97-AF65-F5344CB8AC3E}">
-        <p14:creationId xmlns:p14="http://schemas.microsoft.com/office/powerpoint/2010/main" val="3169629679"/>
+        <p14:creationId xmlns:p14="http://schemas.microsoft.com/office/powerpoint/2010/main" val="3897852710"/>
       </p:ext>
     </p:extLst>
   </p:cSld>
   <p:clrMapOvr>
     <a:masterClrMapping/>
   </p:clrMapOvr>
+  <p:timing>
+    <p:tnLst>
+      <p:par>
+        <p:cTn id="1" dur="indefinite" restart="never" nodeType="tmRoot"/>
+      </p:par>
+    </p:tnLst>
+  </p:timing>
 </p:sld>
 </file>
 
-<file path=ppt/slides/slide3.xml><?xml version="1.0" encoding="utf-8"?>
+<file path=ppt/slides/slide11.xml><?xml version="1.0" encoding="utf-8"?>
 <p:sld xmlns:a="http://schemas.openxmlformats.org/drawingml/2006/main" xmlns:r="http://schemas.openxmlformats.org/officeDocument/2006/relationships" xmlns:p="http://schemas.openxmlformats.org/presentationml/2006/main">
   <p:cSld>
     <p:spTree>
@@ -9236,7 +10410,7 @@
             <a:fld id="{4EACBA47-91FC-4F0F-98EF-AF8B449ABA17}" type="slidenum">
               <a:rPr lang="nl-NL" noProof="0" smtClean="0"/>
               <a:pPr/>
-              <a:t>3</a:t>
+              <a:t>11</a:t>
             </a:fld>
             <a:endParaRPr lang="nl-NL" noProof="0" dirty="0"/>
           </a:p>
@@ -9562,20 +10736,67 @@
               <a:buChar char="Ø"/>
             </a:pPr>
             <a:r>
+              <a:rPr lang="nl-NL" dirty="0">
+                <a:hlinkClick r:id="rId5"/>
+              </a:rPr>
+              <a:t>http://www.brianstorti.com/the-actor-model</a:t>
+            </a:r>
+            <a:r>
               <a:rPr lang="nl-NL" dirty="0" smtClean="0">
                 <a:hlinkClick r:id="rId5"/>
               </a:rPr>
+              <a:t>/</a:t>
+            </a:r>
+            <a:r>
+              <a:rPr lang="nl-NL" dirty="0" smtClean="0"/>
+              <a:t> </a:t>
+            </a:r>
+          </a:p>
+          <a:p>
+            <a:pPr>
+              <a:lnSpc>
+                <a:spcPct val="100000"/>
+              </a:lnSpc>
+              <a:buFont typeface="Wingdings" panose="05000000000000000000" pitchFamily="2" charset="2"/>
+              <a:buChar char="Ø"/>
+            </a:pPr>
+            <a:r>
+              <a:rPr lang="nl-NL" dirty="0" smtClean="0">
+                <a:hlinkClick r:id="rId6"/>
+              </a:rPr>
               <a:t>http</a:t>
             </a:r>
             <a:r>
               <a:rPr lang="nl-NL" dirty="0">
-                <a:hlinkClick r:id="rId5"/>
+                <a:hlinkClick r:id="rId6"/>
               </a:rPr>
               <a:t>://www.reactivemanifesto.org</a:t>
             </a:r>
             <a:r>
               <a:rPr lang="nl-NL" dirty="0" smtClean="0">
-                <a:hlinkClick r:id="rId5"/>
+                <a:hlinkClick r:id="rId6"/>
+              </a:rPr>
+              <a:t>/</a:t>
+            </a:r>
+            <a:endParaRPr lang="nl-NL" dirty="0"/>
+          </a:p>
+          <a:p>
+            <a:pPr>
+              <a:lnSpc>
+                <a:spcPct val="100000"/>
+              </a:lnSpc>
+              <a:buFont typeface="Wingdings" panose="05000000000000000000" pitchFamily="2" charset="2"/>
+              <a:buChar char="Ø"/>
+            </a:pPr>
+            <a:r>
+              <a:rPr lang="nl-NL" dirty="0">
+                <a:hlinkClick r:id="rId7"/>
+              </a:rPr>
+              <a:t>https://mikhail.io/2016/02/akka-net-style-actors-in-service-fabric</a:t>
+            </a:r>
+            <a:r>
+              <a:rPr lang="nl-NL" dirty="0" smtClean="0">
+                <a:hlinkClick r:id="rId7"/>
               </a:rPr>
               <a:t>/</a:t>
             </a:r>
@@ -9619,12 +10840,12 @@
             </a:pPr>
             <a:r>
               <a:rPr lang="nl-NL" dirty="0">
-                <a:hlinkClick r:id="rId6"/>
+                <a:hlinkClick r:id="rId8"/>
               </a:rPr>
               <a:t>http://getakka.net/</a:t>
             </a:r>
             <a:endParaRPr lang="nl-NL" dirty="0" smtClean="0">
-              <a:hlinkClick r:id="rId6"/>
+              <a:hlinkClick r:id="rId8"/>
             </a:endParaRPr>
           </a:p>
           <a:p>
@@ -9653,6 +10874,2934 @@
   <p:clrMapOvr>
     <a:masterClrMapping/>
   </p:clrMapOvr>
+  <p:timing>
+    <p:tnLst>
+      <p:par>
+        <p:cTn id="1" dur="indefinite" restart="never" nodeType="tmRoot"/>
+      </p:par>
+    </p:tnLst>
+  </p:timing>
+</p:sld>
+</file>
+
+<file path=ppt/slides/slide2.xml><?xml version="1.0" encoding="utf-8"?>
+<p:sld xmlns:a="http://schemas.openxmlformats.org/drawingml/2006/main" xmlns:r="http://schemas.openxmlformats.org/officeDocument/2006/relationships" xmlns:p="http://schemas.openxmlformats.org/presentationml/2006/main">
+  <p:cSld>
+    <p:spTree>
+      <p:nvGrpSpPr>
+        <p:cNvPr id="1" name=""/>
+        <p:cNvGrpSpPr/>
+        <p:nvPr/>
+      </p:nvGrpSpPr>
+      <p:grpSpPr>
+        <a:xfrm>
+          <a:off x="0" y="0"/>
+          <a:ext cx="0" cy="0"/>
+          <a:chOff x="0" y="0"/>
+          <a:chExt cx="0" cy="0"/>
+        </a:xfrm>
+      </p:grpSpPr>
+      <p:sp>
+        <p:nvSpPr>
+          <p:cNvPr id="4" name="Slide Number Placeholder 3"/>
+          <p:cNvSpPr>
+            <a:spLocks noGrp="1"/>
+          </p:cNvSpPr>
+          <p:nvPr>
+            <p:ph type="sldNum" sz="quarter" idx="10"/>
+          </p:nvPr>
+        </p:nvSpPr>
+        <p:spPr/>
+        <p:txBody>
+          <a:bodyPr/>
+          <a:lstStyle/>
+          <a:p>
+            <a:fld id="{4EACBA47-91FC-4F0F-98EF-AF8B449ABA17}" type="slidenum">
+              <a:rPr lang="nl-NL" noProof="0" smtClean="0"/>
+              <a:pPr/>
+              <a:t>2</a:t>
+            </a:fld>
+            <a:endParaRPr lang="nl-NL" noProof="0" dirty="0"/>
+          </a:p>
+        </p:txBody>
+      </p:sp>
+      <p:sp>
+        <p:nvSpPr>
+          <p:cNvPr id="3" name="Footer Placeholder 2"/>
+          <p:cNvSpPr>
+            <a:spLocks noGrp="1"/>
+          </p:cNvSpPr>
+          <p:nvPr>
+            <p:ph type="ftr" sz="quarter" idx="11"/>
+          </p:nvPr>
+        </p:nvSpPr>
+        <p:spPr>
+          <a:xfrm>
+            <a:off x="1884624" y="4692511"/>
+            <a:ext cx="6621144" cy="192360"/>
+          </a:xfrm>
+        </p:spPr>
+        <p:txBody>
+          <a:bodyPr/>
+          <a:lstStyle/>
+          <a:p>
+            <a:r>
+              <a:rPr lang="nl-NL" dirty="0" err="1"/>
+              <a:t>Akka,Net</a:t>
+            </a:r>
+            <a:r>
+              <a:rPr lang="nl-NL" dirty="0"/>
+              <a:t> Pizza Sessie</a:t>
+            </a:r>
+          </a:p>
+        </p:txBody>
+      </p:sp>
+      <p:sp>
+        <p:nvSpPr>
+          <p:cNvPr id="2" name="Title 1"/>
+          <p:cNvSpPr>
+            <a:spLocks noGrp="1"/>
+          </p:cNvSpPr>
+          <p:nvPr>
+            <p:ph type="title"/>
+          </p:nvPr>
+        </p:nvSpPr>
+        <p:spPr>
+          <a:xfrm>
+            <a:off x="285294" y="129454"/>
+            <a:ext cx="8460000" cy="685800"/>
+          </a:xfrm>
+        </p:spPr>
+        <p:txBody>
+          <a:bodyPr/>
+          <a:lstStyle/>
+          <a:p>
+            <a:r>
+              <a:rPr lang="nl-NL" dirty="0" smtClean="0"/>
+              <a:t>Introductie</a:t>
+            </a:r>
+            <a:endParaRPr lang="nl-NL" dirty="0"/>
+          </a:p>
+        </p:txBody>
+      </p:sp>
+      <p:sp>
+        <p:nvSpPr>
+          <p:cNvPr id="5" name="Content Placeholder 2"/>
+          <p:cNvSpPr txBox="1">
+            <a:spLocks/>
+          </p:cNvSpPr>
+          <p:nvPr/>
+        </p:nvSpPr>
+        <p:spPr>
+          <a:xfrm>
+            <a:off x="246228" y="1122560"/>
+            <a:ext cx="10058400" cy="4023360"/>
+          </a:xfrm>
+          <a:prstGeom prst="rect">
+            <a:avLst/>
+          </a:prstGeom>
+        </p:spPr>
+        <p:txBody>
+          <a:bodyPr>
+            <a:normAutofit/>
+          </a:bodyPr>
+          <a:lstStyle>
+            <a:lvl1pPr marL="351000" indent="-351000" algn="l" defTabSz="685800" rtl="0" eaLnBrk="1" latinLnBrk="0" hangingPunct="1">
+              <a:lnSpc>
+                <a:spcPts val="2000"/>
+              </a:lnSpc>
+              <a:spcBef>
+                <a:spcPts val="0"/>
+              </a:spcBef>
+              <a:buFont typeface="Wingdings 3" pitchFamily="18" charset="2"/>
+              <a:buChar char=""/>
+              <a:tabLst/>
+              <a:defRPr sz="1800" b="1" kern="1200">
+                <a:solidFill>
+                  <a:schemeClr val="tx1"/>
+                </a:solidFill>
+                <a:latin typeface="+mn-lt"/>
+                <a:ea typeface="+mn-ea"/>
+                <a:cs typeface="+mn-cs"/>
+              </a:defRPr>
+            </a:lvl1pPr>
+            <a:lvl2pPr marL="675000" indent="-350044" algn="l" defTabSz="740569" rtl="0" eaLnBrk="1" latinLnBrk="0" hangingPunct="1">
+              <a:lnSpc>
+                <a:spcPts val="2000"/>
+              </a:lnSpc>
+              <a:spcBef>
+                <a:spcPts val="0"/>
+              </a:spcBef>
+              <a:buFont typeface="Wingdings 3" pitchFamily="18" charset="2"/>
+              <a:buChar char=""/>
+              <a:tabLst/>
+              <a:defRPr sz="1800" b="1" kern="1200">
+                <a:solidFill>
+                  <a:schemeClr val="tx1"/>
+                </a:solidFill>
+                <a:latin typeface="+mn-lt"/>
+                <a:ea typeface="+mn-ea"/>
+                <a:cs typeface="+mn-cs"/>
+              </a:defRPr>
+            </a:lvl2pPr>
+            <a:lvl3pPr marL="1010841" indent="-350044" algn="l" defTabSz="740569" rtl="0" eaLnBrk="1" latinLnBrk="0" hangingPunct="1">
+              <a:lnSpc>
+                <a:spcPts val="2000"/>
+              </a:lnSpc>
+              <a:spcBef>
+                <a:spcPts val="0"/>
+              </a:spcBef>
+              <a:buFont typeface="Century Gothic" pitchFamily="34" charset="0"/>
+              <a:buChar char="•"/>
+              <a:tabLst/>
+              <a:defRPr sz="1800" b="1" kern="1200">
+                <a:solidFill>
+                  <a:schemeClr val="tx1"/>
+                </a:solidFill>
+                <a:latin typeface="+mn-lt"/>
+                <a:ea typeface="+mn-ea"/>
+                <a:cs typeface="+mn-cs"/>
+              </a:defRPr>
+            </a:lvl3pPr>
+            <a:lvl4pPr marL="1345406" indent="-350044" algn="l" defTabSz="685800" rtl="0" eaLnBrk="1" latinLnBrk="0" hangingPunct="1">
+              <a:lnSpc>
+                <a:spcPts val="1800"/>
+              </a:lnSpc>
+              <a:spcBef>
+                <a:spcPts val="0"/>
+              </a:spcBef>
+              <a:buFont typeface="Century Gothic" pitchFamily="34" charset="0"/>
+              <a:buChar char="•"/>
+              <a:defRPr sz="1400" b="1" kern="1200">
+                <a:solidFill>
+                  <a:schemeClr val="tx1"/>
+                </a:solidFill>
+                <a:latin typeface="+mn-lt"/>
+                <a:ea typeface="+mn-ea"/>
+                <a:cs typeface="+mn-cs"/>
+              </a:defRPr>
+            </a:lvl4pPr>
+            <a:lvl5pPr marL="1687116" indent="-350044" algn="l" defTabSz="501254" rtl="0" eaLnBrk="1" latinLnBrk="0" hangingPunct="1">
+              <a:lnSpc>
+                <a:spcPts val="1800"/>
+              </a:lnSpc>
+              <a:spcBef>
+                <a:spcPts val="0"/>
+              </a:spcBef>
+              <a:buFont typeface="Century Gothic" pitchFamily="34" charset="0"/>
+              <a:buChar char="•"/>
+              <a:defRPr sz="1400" b="1" kern="1200">
+                <a:solidFill>
+                  <a:schemeClr val="tx1"/>
+                </a:solidFill>
+                <a:latin typeface="+mn-lt"/>
+                <a:ea typeface="+mn-ea"/>
+                <a:cs typeface="+mn-cs"/>
+              </a:defRPr>
+            </a:lvl5pPr>
+            <a:lvl6pPr marL="1885950" indent="-171450" algn="l" defTabSz="685800" rtl="0" eaLnBrk="1" latinLnBrk="0" hangingPunct="1">
+              <a:spcBef>
+                <a:spcPct val="20000"/>
+              </a:spcBef>
+              <a:buFont typeface="Arial" pitchFamily="34" charset="0"/>
+              <a:buChar char="•"/>
+              <a:defRPr sz="1500" kern="1200">
+                <a:solidFill>
+                  <a:schemeClr val="tx1"/>
+                </a:solidFill>
+                <a:latin typeface="+mn-lt"/>
+                <a:ea typeface="+mn-ea"/>
+                <a:cs typeface="+mn-cs"/>
+              </a:defRPr>
+            </a:lvl6pPr>
+            <a:lvl7pPr marL="2228850" indent="-171450" algn="l" defTabSz="685800" rtl="0" eaLnBrk="1" latinLnBrk="0" hangingPunct="1">
+              <a:spcBef>
+                <a:spcPct val="20000"/>
+              </a:spcBef>
+              <a:buFont typeface="Arial" pitchFamily="34" charset="0"/>
+              <a:buChar char="•"/>
+              <a:defRPr sz="1500" kern="1200">
+                <a:solidFill>
+                  <a:schemeClr val="tx1"/>
+                </a:solidFill>
+                <a:latin typeface="+mn-lt"/>
+                <a:ea typeface="+mn-ea"/>
+                <a:cs typeface="+mn-cs"/>
+              </a:defRPr>
+            </a:lvl7pPr>
+            <a:lvl8pPr marL="2571750" indent="-171450" algn="l" defTabSz="685800" rtl="0" eaLnBrk="1" latinLnBrk="0" hangingPunct="1">
+              <a:spcBef>
+                <a:spcPct val="20000"/>
+              </a:spcBef>
+              <a:buFont typeface="Arial" pitchFamily="34" charset="0"/>
+              <a:buChar char="•"/>
+              <a:defRPr sz="1500" kern="1200">
+                <a:solidFill>
+                  <a:schemeClr val="tx1"/>
+                </a:solidFill>
+                <a:latin typeface="+mn-lt"/>
+                <a:ea typeface="+mn-ea"/>
+                <a:cs typeface="+mn-cs"/>
+              </a:defRPr>
+            </a:lvl8pPr>
+            <a:lvl9pPr marL="2914650" indent="-171450" algn="l" defTabSz="685800" rtl="0" eaLnBrk="1" latinLnBrk="0" hangingPunct="1">
+              <a:spcBef>
+                <a:spcPct val="20000"/>
+              </a:spcBef>
+              <a:buFont typeface="Arial" pitchFamily="34" charset="0"/>
+              <a:buChar char="•"/>
+              <a:defRPr sz="1500" kern="1200">
+                <a:solidFill>
+                  <a:schemeClr val="tx1"/>
+                </a:solidFill>
+                <a:latin typeface="+mn-lt"/>
+                <a:ea typeface="+mn-ea"/>
+                <a:cs typeface="+mn-cs"/>
+              </a:defRPr>
+            </a:lvl9pPr>
+          </a:lstStyle>
+          <a:p>
+            <a:pPr marL="0" indent="0">
+              <a:lnSpc>
+                <a:spcPct val="100000"/>
+              </a:lnSpc>
+              <a:buNone/>
+            </a:pPr>
+            <a:r>
+              <a:rPr lang="nl-NL" dirty="0" err="1" smtClean="0"/>
+              <a:t>Akka.Net</a:t>
+            </a:r>
+            <a:endParaRPr lang="nl-NL" dirty="0" smtClean="0"/>
+          </a:p>
+          <a:p>
+            <a:pPr>
+              <a:lnSpc>
+                <a:spcPct val="100000"/>
+              </a:lnSpc>
+              <a:buFont typeface="Wingdings" panose="05000000000000000000" pitchFamily="2" charset="2"/>
+              <a:buChar char="Ø"/>
+            </a:pPr>
+            <a:r>
+              <a:rPr lang="nl-NL" dirty="0" smtClean="0"/>
+              <a:t>Port van </a:t>
+            </a:r>
+            <a:r>
+              <a:rPr lang="nl-NL" dirty="0" err="1" smtClean="0"/>
+              <a:t>Akka</a:t>
+            </a:r>
+            <a:r>
+              <a:rPr lang="nl-NL" dirty="0" smtClean="0"/>
+              <a:t> voor de JVM</a:t>
+            </a:r>
+          </a:p>
+          <a:p>
+            <a:pPr>
+              <a:lnSpc>
+                <a:spcPct val="100000"/>
+              </a:lnSpc>
+              <a:buFont typeface="Wingdings" panose="05000000000000000000" pitchFamily="2" charset="2"/>
+              <a:buChar char="Ø"/>
+            </a:pPr>
+            <a:r>
+              <a:rPr lang="nl-NL" dirty="0" smtClean="0"/>
+              <a:t>Actor </a:t>
+            </a:r>
+            <a:r>
+              <a:rPr lang="nl-NL" dirty="0" err="1" smtClean="0"/>
+              <a:t>gebasseerd</a:t>
+            </a:r>
+            <a:endParaRPr lang="nl-NL" dirty="0"/>
+          </a:p>
+          <a:p>
+            <a:pPr>
+              <a:lnSpc>
+                <a:spcPct val="100000"/>
+              </a:lnSpc>
+              <a:buFont typeface="Wingdings" panose="05000000000000000000" pitchFamily="2" charset="2"/>
+              <a:buChar char="Ø"/>
+            </a:pPr>
+            <a:r>
+              <a:rPr lang="nl-NL" dirty="0" err="1" smtClean="0"/>
+              <a:t>Reactive</a:t>
+            </a:r>
+            <a:endParaRPr lang="nl-NL" dirty="0" smtClean="0"/>
+          </a:p>
+          <a:p>
+            <a:pPr>
+              <a:lnSpc>
+                <a:spcPct val="100000"/>
+              </a:lnSpc>
+              <a:buFont typeface="Wingdings" panose="05000000000000000000" pitchFamily="2" charset="2"/>
+              <a:buChar char="Ø"/>
+            </a:pPr>
+            <a:r>
+              <a:rPr lang="nl-NL" dirty="0" smtClean="0"/>
+              <a:t>Past bij microservices</a:t>
+            </a:r>
+          </a:p>
+          <a:p>
+            <a:pPr>
+              <a:lnSpc>
+                <a:spcPct val="100000"/>
+              </a:lnSpc>
+              <a:buFont typeface="Wingdings" panose="05000000000000000000" pitchFamily="2" charset="2"/>
+              <a:buChar char="Ø"/>
+            </a:pPr>
+            <a:r>
+              <a:rPr lang="nl-NL" dirty="0" smtClean="0"/>
+              <a:t>Past bij IOT.</a:t>
+            </a:r>
+          </a:p>
+          <a:p>
+            <a:pPr>
+              <a:lnSpc>
+                <a:spcPct val="100000"/>
+              </a:lnSpc>
+              <a:buFont typeface="Wingdings" panose="05000000000000000000" pitchFamily="2" charset="2"/>
+              <a:buChar char="Ø"/>
+            </a:pPr>
+            <a:endParaRPr lang="nl-NL" dirty="0"/>
+          </a:p>
+          <a:p>
+            <a:pPr marL="0" indent="0">
+              <a:lnSpc>
+                <a:spcPct val="100000"/>
+              </a:lnSpc>
+              <a:buNone/>
+            </a:pPr>
+            <a:endParaRPr lang="nl-NL" dirty="0" smtClean="0"/>
+          </a:p>
+          <a:p>
+            <a:pPr>
+              <a:lnSpc>
+                <a:spcPct val="100000"/>
+              </a:lnSpc>
+              <a:buFont typeface="Wingdings" panose="05000000000000000000" pitchFamily="2" charset="2"/>
+              <a:buChar char="Ø"/>
+            </a:pPr>
+            <a:endParaRPr lang="nl-NL" dirty="0"/>
+          </a:p>
+          <a:p>
+            <a:pPr marL="0" indent="0">
+              <a:lnSpc>
+                <a:spcPct val="100000"/>
+              </a:lnSpc>
+              <a:buNone/>
+            </a:pPr>
+            <a:endParaRPr lang="nl-NL" dirty="0"/>
+          </a:p>
+        </p:txBody>
+      </p:sp>
+    </p:spTree>
+    <p:extLst>
+      <p:ext uri="{BB962C8B-B14F-4D97-AF65-F5344CB8AC3E}">
+        <p14:creationId xmlns:p14="http://schemas.microsoft.com/office/powerpoint/2010/main" val="3169629679"/>
+      </p:ext>
+    </p:extLst>
+  </p:cSld>
+  <p:clrMapOvr>
+    <a:masterClrMapping/>
+  </p:clrMapOvr>
+  <p:timing>
+    <p:tnLst>
+      <p:par>
+        <p:cTn id="1" dur="indefinite" restart="never" nodeType="tmRoot"/>
+      </p:par>
+    </p:tnLst>
+  </p:timing>
+</p:sld>
+</file>
+
+<file path=ppt/slides/slide3.xml><?xml version="1.0" encoding="utf-8"?>
+<p:sld xmlns:a="http://schemas.openxmlformats.org/drawingml/2006/main" xmlns:r="http://schemas.openxmlformats.org/officeDocument/2006/relationships" xmlns:p="http://schemas.openxmlformats.org/presentationml/2006/main">
+  <p:cSld>
+    <p:spTree>
+      <p:nvGrpSpPr>
+        <p:cNvPr id="1" name=""/>
+        <p:cNvGrpSpPr/>
+        <p:nvPr/>
+      </p:nvGrpSpPr>
+      <p:grpSpPr>
+        <a:xfrm>
+          <a:off x="0" y="0"/>
+          <a:ext cx="0" cy="0"/>
+          <a:chOff x="0" y="0"/>
+          <a:chExt cx="0" cy="0"/>
+        </a:xfrm>
+      </p:grpSpPr>
+      <p:sp>
+        <p:nvSpPr>
+          <p:cNvPr id="4" name="Slide Number Placeholder 3"/>
+          <p:cNvSpPr>
+            <a:spLocks noGrp="1"/>
+          </p:cNvSpPr>
+          <p:nvPr>
+            <p:ph type="sldNum" sz="quarter" idx="10"/>
+          </p:nvPr>
+        </p:nvSpPr>
+        <p:spPr/>
+        <p:txBody>
+          <a:bodyPr/>
+          <a:lstStyle/>
+          <a:p>
+            <a:fld id="{4EACBA47-91FC-4F0F-98EF-AF8B449ABA17}" type="slidenum">
+              <a:rPr lang="nl-NL" noProof="0" smtClean="0"/>
+              <a:pPr/>
+              <a:t>3</a:t>
+            </a:fld>
+            <a:endParaRPr lang="nl-NL" noProof="0" dirty="0"/>
+          </a:p>
+        </p:txBody>
+      </p:sp>
+      <p:sp>
+        <p:nvSpPr>
+          <p:cNvPr id="3" name="Footer Placeholder 2"/>
+          <p:cNvSpPr>
+            <a:spLocks noGrp="1"/>
+          </p:cNvSpPr>
+          <p:nvPr>
+            <p:ph type="ftr" sz="quarter" idx="11"/>
+          </p:nvPr>
+        </p:nvSpPr>
+        <p:spPr>
+          <a:xfrm>
+            <a:off x="1884624" y="4692511"/>
+            <a:ext cx="6621144" cy="192360"/>
+          </a:xfrm>
+        </p:spPr>
+        <p:txBody>
+          <a:bodyPr/>
+          <a:lstStyle/>
+          <a:p>
+            <a:r>
+              <a:rPr lang="nl-NL" dirty="0" err="1"/>
+              <a:t>Akka,Net</a:t>
+            </a:r>
+            <a:r>
+              <a:rPr lang="nl-NL" dirty="0"/>
+              <a:t> Pizza Sessie</a:t>
+            </a:r>
+          </a:p>
+        </p:txBody>
+      </p:sp>
+      <p:sp>
+        <p:nvSpPr>
+          <p:cNvPr id="2" name="Title 1"/>
+          <p:cNvSpPr>
+            <a:spLocks noGrp="1"/>
+          </p:cNvSpPr>
+          <p:nvPr>
+            <p:ph type="title"/>
+          </p:nvPr>
+        </p:nvSpPr>
+        <p:spPr>
+          <a:xfrm>
+            <a:off x="285294" y="129454"/>
+            <a:ext cx="8460000" cy="685800"/>
+          </a:xfrm>
+        </p:spPr>
+        <p:txBody>
+          <a:bodyPr/>
+          <a:lstStyle/>
+          <a:p>
+            <a:r>
+              <a:rPr lang="nl-NL" dirty="0" err="1" smtClean="0"/>
+              <a:t>Reactive</a:t>
+            </a:r>
+            <a:endParaRPr lang="nl-NL" dirty="0"/>
+          </a:p>
+        </p:txBody>
+      </p:sp>
+      <p:sp>
+        <p:nvSpPr>
+          <p:cNvPr id="5" name="Content Placeholder 2"/>
+          <p:cNvSpPr txBox="1">
+            <a:spLocks/>
+          </p:cNvSpPr>
+          <p:nvPr/>
+        </p:nvSpPr>
+        <p:spPr>
+          <a:xfrm>
+            <a:off x="246228" y="1122560"/>
+            <a:ext cx="10058400" cy="4023360"/>
+          </a:xfrm>
+          <a:prstGeom prst="rect">
+            <a:avLst/>
+          </a:prstGeom>
+        </p:spPr>
+        <p:txBody>
+          <a:bodyPr>
+            <a:normAutofit/>
+          </a:bodyPr>
+          <a:lstStyle>
+            <a:lvl1pPr marL="351000" indent="-351000" algn="l" defTabSz="685800" rtl="0" eaLnBrk="1" latinLnBrk="0" hangingPunct="1">
+              <a:lnSpc>
+                <a:spcPts val="2000"/>
+              </a:lnSpc>
+              <a:spcBef>
+                <a:spcPts val="0"/>
+              </a:spcBef>
+              <a:buFont typeface="Wingdings 3" pitchFamily="18" charset="2"/>
+              <a:buChar char=""/>
+              <a:tabLst/>
+              <a:defRPr sz="1800" b="1" kern="1200">
+                <a:solidFill>
+                  <a:schemeClr val="tx1"/>
+                </a:solidFill>
+                <a:latin typeface="+mn-lt"/>
+                <a:ea typeface="+mn-ea"/>
+                <a:cs typeface="+mn-cs"/>
+              </a:defRPr>
+            </a:lvl1pPr>
+            <a:lvl2pPr marL="675000" indent="-350044" algn="l" defTabSz="740569" rtl="0" eaLnBrk="1" latinLnBrk="0" hangingPunct="1">
+              <a:lnSpc>
+                <a:spcPts val="2000"/>
+              </a:lnSpc>
+              <a:spcBef>
+                <a:spcPts val="0"/>
+              </a:spcBef>
+              <a:buFont typeface="Wingdings 3" pitchFamily="18" charset="2"/>
+              <a:buChar char=""/>
+              <a:tabLst/>
+              <a:defRPr sz="1800" b="1" kern="1200">
+                <a:solidFill>
+                  <a:schemeClr val="tx1"/>
+                </a:solidFill>
+                <a:latin typeface="+mn-lt"/>
+                <a:ea typeface="+mn-ea"/>
+                <a:cs typeface="+mn-cs"/>
+              </a:defRPr>
+            </a:lvl2pPr>
+            <a:lvl3pPr marL="1010841" indent="-350044" algn="l" defTabSz="740569" rtl="0" eaLnBrk="1" latinLnBrk="0" hangingPunct="1">
+              <a:lnSpc>
+                <a:spcPts val="2000"/>
+              </a:lnSpc>
+              <a:spcBef>
+                <a:spcPts val="0"/>
+              </a:spcBef>
+              <a:buFont typeface="Century Gothic" pitchFamily="34" charset="0"/>
+              <a:buChar char="•"/>
+              <a:tabLst/>
+              <a:defRPr sz="1800" b="1" kern="1200">
+                <a:solidFill>
+                  <a:schemeClr val="tx1"/>
+                </a:solidFill>
+                <a:latin typeface="+mn-lt"/>
+                <a:ea typeface="+mn-ea"/>
+                <a:cs typeface="+mn-cs"/>
+              </a:defRPr>
+            </a:lvl3pPr>
+            <a:lvl4pPr marL="1345406" indent="-350044" algn="l" defTabSz="685800" rtl="0" eaLnBrk="1" latinLnBrk="0" hangingPunct="1">
+              <a:lnSpc>
+                <a:spcPts val="1800"/>
+              </a:lnSpc>
+              <a:spcBef>
+                <a:spcPts val="0"/>
+              </a:spcBef>
+              <a:buFont typeface="Century Gothic" pitchFamily="34" charset="0"/>
+              <a:buChar char="•"/>
+              <a:defRPr sz="1400" b="1" kern="1200">
+                <a:solidFill>
+                  <a:schemeClr val="tx1"/>
+                </a:solidFill>
+                <a:latin typeface="+mn-lt"/>
+                <a:ea typeface="+mn-ea"/>
+                <a:cs typeface="+mn-cs"/>
+              </a:defRPr>
+            </a:lvl4pPr>
+            <a:lvl5pPr marL="1687116" indent="-350044" algn="l" defTabSz="501254" rtl="0" eaLnBrk="1" latinLnBrk="0" hangingPunct="1">
+              <a:lnSpc>
+                <a:spcPts val="1800"/>
+              </a:lnSpc>
+              <a:spcBef>
+                <a:spcPts val="0"/>
+              </a:spcBef>
+              <a:buFont typeface="Century Gothic" pitchFamily="34" charset="0"/>
+              <a:buChar char="•"/>
+              <a:defRPr sz="1400" b="1" kern="1200">
+                <a:solidFill>
+                  <a:schemeClr val="tx1"/>
+                </a:solidFill>
+                <a:latin typeface="+mn-lt"/>
+                <a:ea typeface="+mn-ea"/>
+                <a:cs typeface="+mn-cs"/>
+              </a:defRPr>
+            </a:lvl5pPr>
+            <a:lvl6pPr marL="1885950" indent="-171450" algn="l" defTabSz="685800" rtl="0" eaLnBrk="1" latinLnBrk="0" hangingPunct="1">
+              <a:spcBef>
+                <a:spcPct val="20000"/>
+              </a:spcBef>
+              <a:buFont typeface="Arial" pitchFamily="34" charset="0"/>
+              <a:buChar char="•"/>
+              <a:defRPr sz="1500" kern="1200">
+                <a:solidFill>
+                  <a:schemeClr val="tx1"/>
+                </a:solidFill>
+                <a:latin typeface="+mn-lt"/>
+                <a:ea typeface="+mn-ea"/>
+                <a:cs typeface="+mn-cs"/>
+              </a:defRPr>
+            </a:lvl6pPr>
+            <a:lvl7pPr marL="2228850" indent="-171450" algn="l" defTabSz="685800" rtl="0" eaLnBrk="1" latinLnBrk="0" hangingPunct="1">
+              <a:spcBef>
+                <a:spcPct val="20000"/>
+              </a:spcBef>
+              <a:buFont typeface="Arial" pitchFamily="34" charset="0"/>
+              <a:buChar char="•"/>
+              <a:defRPr sz="1500" kern="1200">
+                <a:solidFill>
+                  <a:schemeClr val="tx1"/>
+                </a:solidFill>
+                <a:latin typeface="+mn-lt"/>
+                <a:ea typeface="+mn-ea"/>
+                <a:cs typeface="+mn-cs"/>
+              </a:defRPr>
+            </a:lvl7pPr>
+            <a:lvl8pPr marL="2571750" indent="-171450" algn="l" defTabSz="685800" rtl="0" eaLnBrk="1" latinLnBrk="0" hangingPunct="1">
+              <a:spcBef>
+                <a:spcPct val="20000"/>
+              </a:spcBef>
+              <a:buFont typeface="Arial" pitchFamily="34" charset="0"/>
+              <a:buChar char="•"/>
+              <a:defRPr sz="1500" kern="1200">
+                <a:solidFill>
+                  <a:schemeClr val="tx1"/>
+                </a:solidFill>
+                <a:latin typeface="+mn-lt"/>
+                <a:ea typeface="+mn-ea"/>
+                <a:cs typeface="+mn-cs"/>
+              </a:defRPr>
+            </a:lvl8pPr>
+            <a:lvl9pPr marL="2914650" indent="-171450" algn="l" defTabSz="685800" rtl="0" eaLnBrk="1" latinLnBrk="0" hangingPunct="1">
+              <a:spcBef>
+                <a:spcPct val="20000"/>
+              </a:spcBef>
+              <a:buFont typeface="Arial" pitchFamily="34" charset="0"/>
+              <a:buChar char="•"/>
+              <a:defRPr sz="1500" kern="1200">
+                <a:solidFill>
+                  <a:schemeClr val="tx1"/>
+                </a:solidFill>
+                <a:latin typeface="+mn-lt"/>
+                <a:ea typeface="+mn-ea"/>
+                <a:cs typeface="+mn-cs"/>
+              </a:defRPr>
+            </a:lvl9pPr>
+          </a:lstStyle>
+          <a:p>
+            <a:pPr marL="0" indent="0">
+              <a:lnSpc>
+                <a:spcPct val="100000"/>
+              </a:lnSpc>
+              <a:buNone/>
+            </a:pPr>
+            <a:endParaRPr lang="nl-NL" dirty="0"/>
+          </a:p>
+          <a:p>
+            <a:pPr marL="0" indent="0">
+              <a:lnSpc>
+                <a:spcPct val="100000"/>
+              </a:lnSpc>
+              <a:buNone/>
+            </a:pPr>
+            <a:endParaRPr lang="nl-NL" dirty="0" smtClean="0"/>
+          </a:p>
+          <a:p>
+            <a:pPr>
+              <a:lnSpc>
+                <a:spcPct val="100000"/>
+              </a:lnSpc>
+              <a:buFont typeface="Wingdings" panose="05000000000000000000" pitchFamily="2" charset="2"/>
+              <a:buChar char="Ø"/>
+            </a:pPr>
+            <a:endParaRPr lang="nl-NL" dirty="0"/>
+          </a:p>
+          <a:p>
+            <a:pPr marL="0" indent="0">
+              <a:lnSpc>
+                <a:spcPct val="100000"/>
+              </a:lnSpc>
+              <a:buNone/>
+            </a:pPr>
+            <a:endParaRPr lang="nl-NL" dirty="0"/>
+          </a:p>
+        </p:txBody>
+      </p:sp>
+      <p:pic>
+        <p:nvPicPr>
+          <p:cNvPr id="7" name="Picture 6"/>
+          <p:cNvPicPr>
+            <a:picLocks noChangeAspect="1"/>
+          </p:cNvPicPr>
+          <p:nvPr/>
+        </p:nvPicPr>
+        <p:blipFill>
+          <a:blip r:embed="rId3"/>
+          <a:stretch>
+            <a:fillRect/>
+          </a:stretch>
+        </p:blipFill>
+        <p:spPr>
+          <a:xfrm>
+            <a:off x="1804392" y="692524"/>
+            <a:ext cx="5455855" cy="4096167"/>
+          </a:xfrm>
+          <a:prstGeom prst="rect">
+            <a:avLst/>
+          </a:prstGeom>
+        </p:spPr>
+      </p:pic>
+    </p:spTree>
+    <p:extLst>
+      <p:ext uri="{BB962C8B-B14F-4D97-AF65-F5344CB8AC3E}">
+        <p14:creationId xmlns:p14="http://schemas.microsoft.com/office/powerpoint/2010/main" val="3929926126"/>
+      </p:ext>
+    </p:extLst>
+  </p:cSld>
+  <p:clrMapOvr>
+    <a:masterClrMapping/>
+  </p:clrMapOvr>
+  <p:timing>
+    <p:tnLst>
+      <p:par>
+        <p:cTn id="1" dur="indefinite" restart="never" nodeType="tmRoot"/>
+      </p:par>
+    </p:tnLst>
+  </p:timing>
+</p:sld>
+</file>
+
+<file path=ppt/slides/slide4.xml><?xml version="1.0" encoding="utf-8"?>
+<p:sld xmlns:a="http://schemas.openxmlformats.org/drawingml/2006/main" xmlns:r="http://schemas.openxmlformats.org/officeDocument/2006/relationships" xmlns:p="http://schemas.openxmlformats.org/presentationml/2006/main">
+  <p:cSld>
+    <p:spTree>
+      <p:nvGrpSpPr>
+        <p:cNvPr id="1" name=""/>
+        <p:cNvGrpSpPr/>
+        <p:nvPr/>
+      </p:nvGrpSpPr>
+      <p:grpSpPr>
+        <a:xfrm>
+          <a:off x="0" y="0"/>
+          <a:ext cx="0" cy="0"/>
+          <a:chOff x="0" y="0"/>
+          <a:chExt cx="0" cy="0"/>
+        </a:xfrm>
+      </p:grpSpPr>
+      <p:sp>
+        <p:nvSpPr>
+          <p:cNvPr id="4" name="Slide Number Placeholder 3"/>
+          <p:cNvSpPr>
+            <a:spLocks noGrp="1"/>
+          </p:cNvSpPr>
+          <p:nvPr>
+            <p:ph type="sldNum" sz="quarter" idx="10"/>
+          </p:nvPr>
+        </p:nvSpPr>
+        <p:spPr/>
+        <p:txBody>
+          <a:bodyPr/>
+          <a:lstStyle/>
+          <a:p>
+            <a:fld id="{4EACBA47-91FC-4F0F-98EF-AF8B449ABA17}" type="slidenum">
+              <a:rPr lang="nl-NL" noProof="0" smtClean="0"/>
+              <a:pPr/>
+              <a:t>4</a:t>
+            </a:fld>
+            <a:endParaRPr lang="nl-NL" noProof="0" dirty="0"/>
+          </a:p>
+        </p:txBody>
+      </p:sp>
+      <p:sp>
+        <p:nvSpPr>
+          <p:cNvPr id="3" name="Footer Placeholder 2"/>
+          <p:cNvSpPr>
+            <a:spLocks noGrp="1"/>
+          </p:cNvSpPr>
+          <p:nvPr>
+            <p:ph type="ftr" sz="quarter" idx="11"/>
+          </p:nvPr>
+        </p:nvSpPr>
+        <p:spPr>
+          <a:xfrm>
+            <a:off x="1884624" y="4692511"/>
+            <a:ext cx="6621144" cy="192360"/>
+          </a:xfrm>
+        </p:spPr>
+        <p:txBody>
+          <a:bodyPr/>
+          <a:lstStyle/>
+          <a:p>
+            <a:r>
+              <a:rPr lang="nl-NL" dirty="0" err="1"/>
+              <a:t>Akka,Net</a:t>
+            </a:r>
+            <a:r>
+              <a:rPr lang="nl-NL" dirty="0"/>
+              <a:t> Pizza Sessie</a:t>
+            </a:r>
+          </a:p>
+        </p:txBody>
+      </p:sp>
+      <p:sp>
+        <p:nvSpPr>
+          <p:cNvPr id="2" name="Title 1"/>
+          <p:cNvSpPr>
+            <a:spLocks noGrp="1"/>
+          </p:cNvSpPr>
+          <p:nvPr>
+            <p:ph type="title"/>
+          </p:nvPr>
+        </p:nvSpPr>
+        <p:spPr>
+          <a:xfrm>
+            <a:off x="285294" y="129454"/>
+            <a:ext cx="8460000" cy="685800"/>
+          </a:xfrm>
+        </p:spPr>
+        <p:txBody>
+          <a:bodyPr/>
+          <a:lstStyle/>
+          <a:p>
+            <a:r>
+              <a:rPr lang="nl-NL" dirty="0" smtClean="0"/>
+              <a:t>Actor</a:t>
+            </a:r>
+            <a:endParaRPr lang="nl-NL" dirty="0"/>
+          </a:p>
+        </p:txBody>
+      </p:sp>
+      <p:pic>
+        <p:nvPicPr>
+          <p:cNvPr id="6" name="Picture 5"/>
+          <p:cNvPicPr>
+            <a:picLocks noChangeAspect="1"/>
+          </p:cNvPicPr>
+          <p:nvPr/>
+        </p:nvPicPr>
+        <p:blipFill>
+          <a:blip r:embed="rId3">
+            <a:extLst>
+              <a:ext uri="{28A0092B-C50C-407E-A947-70E740481C1C}">
+                <a14:useLocalDpi xmlns:a14="http://schemas.microsoft.com/office/drawing/2010/main" val="0"/>
+              </a:ext>
+            </a:extLst>
+          </a:blip>
+          <a:stretch>
+            <a:fillRect/>
+          </a:stretch>
+        </p:blipFill>
+        <p:spPr>
+          <a:xfrm>
+            <a:off x="1589188" y="885041"/>
+            <a:ext cx="6526112" cy="3737683"/>
+          </a:xfrm>
+          <a:prstGeom prst="rect">
+            <a:avLst/>
+          </a:prstGeom>
+        </p:spPr>
+      </p:pic>
+    </p:spTree>
+    <p:extLst>
+      <p:ext uri="{BB962C8B-B14F-4D97-AF65-F5344CB8AC3E}">
+        <p14:creationId xmlns:p14="http://schemas.microsoft.com/office/powerpoint/2010/main" val="4286640801"/>
+      </p:ext>
+    </p:extLst>
+  </p:cSld>
+  <p:clrMapOvr>
+    <a:masterClrMapping/>
+  </p:clrMapOvr>
+  <p:timing>
+    <p:tnLst>
+      <p:par>
+        <p:cTn id="1" dur="indefinite" restart="never" nodeType="tmRoot"/>
+      </p:par>
+    </p:tnLst>
+  </p:timing>
+</p:sld>
+</file>
+
+<file path=ppt/slides/slide5.xml><?xml version="1.0" encoding="utf-8"?>
+<p:sld xmlns:a="http://schemas.openxmlformats.org/drawingml/2006/main" xmlns:r="http://schemas.openxmlformats.org/officeDocument/2006/relationships" xmlns:p="http://schemas.openxmlformats.org/presentationml/2006/main">
+  <p:cSld>
+    <p:spTree>
+      <p:nvGrpSpPr>
+        <p:cNvPr id="1" name=""/>
+        <p:cNvGrpSpPr/>
+        <p:nvPr/>
+      </p:nvGrpSpPr>
+      <p:grpSpPr>
+        <a:xfrm>
+          <a:off x="0" y="0"/>
+          <a:ext cx="0" cy="0"/>
+          <a:chOff x="0" y="0"/>
+          <a:chExt cx="0" cy="0"/>
+        </a:xfrm>
+      </p:grpSpPr>
+      <p:sp>
+        <p:nvSpPr>
+          <p:cNvPr id="4" name="Slide Number Placeholder 3"/>
+          <p:cNvSpPr>
+            <a:spLocks noGrp="1"/>
+          </p:cNvSpPr>
+          <p:nvPr>
+            <p:ph type="sldNum" sz="quarter" idx="10"/>
+          </p:nvPr>
+        </p:nvSpPr>
+        <p:spPr/>
+        <p:txBody>
+          <a:bodyPr/>
+          <a:lstStyle/>
+          <a:p>
+            <a:fld id="{4EACBA47-91FC-4F0F-98EF-AF8B449ABA17}" type="slidenum">
+              <a:rPr lang="nl-NL" noProof="0" smtClean="0"/>
+              <a:pPr/>
+              <a:t>5</a:t>
+            </a:fld>
+            <a:endParaRPr lang="nl-NL" noProof="0" dirty="0"/>
+          </a:p>
+        </p:txBody>
+      </p:sp>
+      <p:sp>
+        <p:nvSpPr>
+          <p:cNvPr id="3" name="Footer Placeholder 2"/>
+          <p:cNvSpPr>
+            <a:spLocks noGrp="1"/>
+          </p:cNvSpPr>
+          <p:nvPr>
+            <p:ph type="ftr" sz="quarter" idx="11"/>
+          </p:nvPr>
+        </p:nvSpPr>
+        <p:spPr>
+          <a:xfrm>
+            <a:off x="1884624" y="4692511"/>
+            <a:ext cx="6621144" cy="192360"/>
+          </a:xfrm>
+        </p:spPr>
+        <p:txBody>
+          <a:bodyPr/>
+          <a:lstStyle/>
+          <a:p>
+            <a:r>
+              <a:rPr lang="nl-NL" dirty="0" err="1"/>
+              <a:t>Akka,Net</a:t>
+            </a:r>
+            <a:r>
+              <a:rPr lang="nl-NL" dirty="0"/>
+              <a:t> Pizza Sessie</a:t>
+            </a:r>
+          </a:p>
+        </p:txBody>
+      </p:sp>
+      <p:sp>
+        <p:nvSpPr>
+          <p:cNvPr id="2" name="Title 1"/>
+          <p:cNvSpPr>
+            <a:spLocks noGrp="1"/>
+          </p:cNvSpPr>
+          <p:nvPr>
+            <p:ph type="title"/>
+          </p:nvPr>
+        </p:nvSpPr>
+        <p:spPr>
+          <a:xfrm>
+            <a:off x="285294" y="129454"/>
+            <a:ext cx="8460000" cy="685800"/>
+          </a:xfrm>
+        </p:spPr>
+        <p:txBody>
+          <a:bodyPr/>
+          <a:lstStyle/>
+          <a:p>
+            <a:r>
+              <a:rPr lang="nl-NL" dirty="0" smtClean="0"/>
+              <a:t>Demo</a:t>
+            </a:r>
+            <a:endParaRPr lang="nl-NL" dirty="0"/>
+          </a:p>
+        </p:txBody>
+      </p:sp>
+      <p:sp>
+        <p:nvSpPr>
+          <p:cNvPr id="5" name="Content Placeholder 2"/>
+          <p:cNvSpPr txBox="1">
+            <a:spLocks/>
+          </p:cNvSpPr>
+          <p:nvPr/>
+        </p:nvSpPr>
+        <p:spPr>
+          <a:xfrm>
+            <a:off x="246228" y="1122560"/>
+            <a:ext cx="10058400" cy="4023360"/>
+          </a:xfrm>
+          <a:prstGeom prst="rect">
+            <a:avLst/>
+          </a:prstGeom>
+        </p:spPr>
+        <p:txBody>
+          <a:bodyPr>
+            <a:normAutofit/>
+          </a:bodyPr>
+          <a:lstStyle>
+            <a:lvl1pPr marL="351000" indent="-351000" algn="l" defTabSz="685800" rtl="0" eaLnBrk="1" latinLnBrk="0" hangingPunct="1">
+              <a:lnSpc>
+                <a:spcPts val="2000"/>
+              </a:lnSpc>
+              <a:spcBef>
+                <a:spcPts val="0"/>
+              </a:spcBef>
+              <a:buFont typeface="Wingdings 3" pitchFamily="18" charset="2"/>
+              <a:buChar char=""/>
+              <a:tabLst/>
+              <a:defRPr sz="1800" b="1" kern="1200">
+                <a:solidFill>
+                  <a:schemeClr val="tx1"/>
+                </a:solidFill>
+                <a:latin typeface="+mn-lt"/>
+                <a:ea typeface="+mn-ea"/>
+                <a:cs typeface="+mn-cs"/>
+              </a:defRPr>
+            </a:lvl1pPr>
+            <a:lvl2pPr marL="675000" indent="-350044" algn="l" defTabSz="740569" rtl="0" eaLnBrk="1" latinLnBrk="0" hangingPunct="1">
+              <a:lnSpc>
+                <a:spcPts val="2000"/>
+              </a:lnSpc>
+              <a:spcBef>
+                <a:spcPts val="0"/>
+              </a:spcBef>
+              <a:buFont typeface="Wingdings 3" pitchFamily="18" charset="2"/>
+              <a:buChar char=""/>
+              <a:tabLst/>
+              <a:defRPr sz="1800" b="1" kern="1200">
+                <a:solidFill>
+                  <a:schemeClr val="tx1"/>
+                </a:solidFill>
+                <a:latin typeface="+mn-lt"/>
+                <a:ea typeface="+mn-ea"/>
+                <a:cs typeface="+mn-cs"/>
+              </a:defRPr>
+            </a:lvl2pPr>
+            <a:lvl3pPr marL="1010841" indent="-350044" algn="l" defTabSz="740569" rtl="0" eaLnBrk="1" latinLnBrk="0" hangingPunct="1">
+              <a:lnSpc>
+                <a:spcPts val="2000"/>
+              </a:lnSpc>
+              <a:spcBef>
+                <a:spcPts val="0"/>
+              </a:spcBef>
+              <a:buFont typeface="Century Gothic" pitchFamily="34" charset="0"/>
+              <a:buChar char="•"/>
+              <a:tabLst/>
+              <a:defRPr sz="1800" b="1" kern="1200">
+                <a:solidFill>
+                  <a:schemeClr val="tx1"/>
+                </a:solidFill>
+                <a:latin typeface="+mn-lt"/>
+                <a:ea typeface="+mn-ea"/>
+                <a:cs typeface="+mn-cs"/>
+              </a:defRPr>
+            </a:lvl3pPr>
+            <a:lvl4pPr marL="1345406" indent="-350044" algn="l" defTabSz="685800" rtl="0" eaLnBrk="1" latinLnBrk="0" hangingPunct="1">
+              <a:lnSpc>
+                <a:spcPts val="1800"/>
+              </a:lnSpc>
+              <a:spcBef>
+                <a:spcPts val="0"/>
+              </a:spcBef>
+              <a:buFont typeface="Century Gothic" pitchFamily="34" charset="0"/>
+              <a:buChar char="•"/>
+              <a:defRPr sz="1400" b="1" kern="1200">
+                <a:solidFill>
+                  <a:schemeClr val="tx1"/>
+                </a:solidFill>
+                <a:latin typeface="+mn-lt"/>
+                <a:ea typeface="+mn-ea"/>
+                <a:cs typeface="+mn-cs"/>
+              </a:defRPr>
+            </a:lvl4pPr>
+            <a:lvl5pPr marL="1687116" indent="-350044" algn="l" defTabSz="501254" rtl="0" eaLnBrk="1" latinLnBrk="0" hangingPunct="1">
+              <a:lnSpc>
+                <a:spcPts val="1800"/>
+              </a:lnSpc>
+              <a:spcBef>
+                <a:spcPts val="0"/>
+              </a:spcBef>
+              <a:buFont typeface="Century Gothic" pitchFamily="34" charset="0"/>
+              <a:buChar char="•"/>
+              <a:defRPr sz="1400" b="1" kern="1200">
+                <a:solidFill>
+                  <a:schemeClr val="tx1"/>
+                </a:solidFill>
+                <a:latin typeface="+mn-lt"/>
+                <a:ea typeface="+mn-ea"/>
+                <a:cs typeface="+mn-cs"/>
+              </a:defRPr>
+            </a:lvl5pPr>
+            <a:lvl6pPr marL="1885950" indent="-171450" algn="l" defTabSz="685800" rtl="0" eaLnBrk="1" latinLnBrk="0" hangingPunct="1">
+              <a:spcBef>
+                <a:spcPct val="20000"/>
+              </a:spcBef>
+              <a:buFont typeface="Arial" pitchFamily="34" charset="0"/>
+              <a:buChar char="•"/>
+              <a:defRPr sz="1500" kern="1200">
+                <a:solidFill>
+                  <a:schemeClr val="tx1"/>
+                </a:solidFill>
+                <a:latin typeface="+mn-lt"/>
+                <a:ea typeface="+mn-ea"/>
+                <a:cs typeface="+mn-cs"/>
+              </a:defRPr>
+            </a:lvl6pPr>
+            <a:lvl7pPr marL="2228850" indent="-171450" algn="l" defTabSz="685800" rtl="0" eaLnBrk="1" latinLnBrk="0" hangingPunct="1">
+              <a:spcBef>
+                <a:spcPct val="20000"/>
+              </a:spcBef>
+              <a:buFont typeface="Arial" pitchFamily="34" charset="0"/>
+              <a:buChar char="•"/>
+              <a:defRPr sz="1500" kern="1200">
+                <a:solidFill>
+                  <a:schemeClr val="tx1"/>
+                </a:solidFill>
+                <a:latin typeface="+mn-lt"/>
+                <a:ea typeface="+mn-ea"/>
+                <a:cs typeface="+mn-cs"/>
+              </a:defRPr>
+            </a:lvl7pPr>
+            <a:lvl8pPr marL="2571750" indent="-171450" algn="l" defTabSz="685800" rtl="0" eaLnBrk="1" latinLnBrk="0" hangingPunct="1">
+              <a:spcBef>
+                <a:spcPct val="20000"/>
+              </a:spcBef>
+              <a:buFont typeface="Arial" pitchFamily="34" charset="0"/>
+              <a:buChar char="•"/>
+              <a:defRPr sz="1500" kern="1200">
+                <a:solidFill>
+                  <a:schemeClr val="tx1"/>
+                </a:solidFill>
+                <a:latin typeface="+mn-lt"/>
+                <a:ea typeface="+mn-ea"/>
+                <a:cs typeface="+mn-cs"/>
+              </a:defRPr>
+            </a:lvl8pPr>
+            <a:lvl9pPr marL="2914650" indent="-171450" algn="l" defTabSz="685800" rtl="0" eaLnBrk="1" latinLnBrk="0" hangingPunct="1">
+              <a:spcBef>
+                <a:spcPct val="20000"/>
+              </a:spcBef>
+              <a:buFont typeface="Arial" pitchFamily="34" charset="0"/>
+              <a:buChar char="•"/>
+              <a:defRPr sz="1500" kern="1200">
+                <a:solidFill>
+                  <a:schemeClr val="tx1"/>
+                </a:solidFill>
+                <a:latin typeface="+mn-lt"/>
+                <a:ea typeface="+mn-ea"/>
+                <a:cs typeface="+mn-cs"/>
+              </a:defRPr>
+            </a:lvl9pPr>
+          </a:lstStyle>
+          <a:p>
+            <a:pPr fontAlgn="ctr"/>
+            <a:r>
+              <a:rPr lang="en-GB" dirty="0"/>
+              <a:t>Logging</a:t>
+            </a:r>
+            <a:endParaRPr lang="en-GB" dirty="0" smtClean="0"/>
+          </a:p>
+          <a:p>
+            <a:pPr fontAlgn="ctr"/>
+            <a:r>
+              <a:rPr lang="en-GB" dirty="0" err="1" smtClean="0"/>
+              <a:t>UntypedActor</a:t>
+            </a:r>
+            <a:endParaRPr lang="en-GB" dirty="0"/>
+          </a:p>
+          <a:p>
+            <a:pPr fontAlgn="ctr"/>
+            <a:r>
+              <a:rPr lang="en-GB" dirty="0" err="1"/>
+              <a:t>RecieveActor</a:t>
+            </a:r>
+            <a:endParaRPr lang="en-GB" dirty="0"/>
+          </a:p>
+          <a:p>
+            <a:pPr fontAlgn="ctr"/>
+            <a:r>
+              <a:rPr lang="en-GB" dirty="0"/>
+              <a:t>Become</a:t>
+            </a:r>
+          </a:p>
+          <a:p>
+            <a:pPr fontAlgn="ctr"/>
+            <a:r>
+              <a:rPr lang="en-GB" dirty="0"/>
+              <a:t>Adding and configuring </a:t>
+            </a:r>
+            <a:r>
+              <a:rPr lang="en-GB" dirty="0" err="1"/>
+              <a:t>ninject</a:t>
+            </a:r>
+            <a:endParaRPr lang="en-GB" dirty="0"/>
+          </a:p>
+          <a:p>
+            <a:pPr fontAlgn="ctr"/>
+            <a:r>
+              <a:rPr lang="en-GB" dirty="0"/>
+              <a:t>Unit test</a:t>
+            </a:r>
+          </a:p>
+          <a:p>
+            <a:pPr fontAlgn="ctr"/>
+            <a:endParaRPr lang="en-GB" dirty="0"/>
+          </a:p>
+          <a:p>
+            <a:pPr marL="0" indent="0">
+              <a:lnSpc>
+                <a:spcPct val="100000"/>
+              </a:lnSpc>
+              <a:buNone/>
+            </a:pPr>
+            <a:endParaRPr lang="nl-NL" dirty="0"/>
+          </a:p>
+          <a:p>
+            <a:pPr marL="0" indent="0">
+              <a:lnSpc>
+                <a:spcPct val="100000"/>
+              </a:lnSpc>
+              <a:buNone/>
+            </a:pPr>
+            <a:endParaRPr lang="nl-NL" dirty="0" smtClean="0"/>
+          </a:p>
+          <a:p>
+            <a:pPr>
+              <a:lnSpc>
+                <a:spcPct val="100000"/>
+              </a:lnSpc>
+              <a:buFont typeface="Wingdings" panose="05000000000000000000" pitchFamily="2" charset="2"/>
+              <a:buChar char="Ø"/>
+            </a:pPr>
+            <a:endParaRPr lang="nl-NL" dirty="0"/>
+          </a:p>
+          <a:p>
+            <a:pPr marL="0" indent="0">
+              <a:lnSpc>
+                <a:spcPct val="100000"/>
+              </a:lnSpc>
+              <a:buNone/>
+            </a:pPr>
+            <a:endParaRPr lang="nl-NL" dirty="0"/>
+          </a:p>
+        </p:txBody>
+      </p:sp>
+    </p:spTree>
+    <p:extLst>
+      <p:ext uri="{BB962C8B-B14F-4D97-AF65-F5344CB8AC3E}">
+        <p14:creationId xmlns:p14="http://schemas.microsoft.com/office/powerpoint/2010/main" val="2064343481"/>
+      </p:ext>
+    </p:extLst>
+  </p:cSld>
+  <p:clrMapOvr>
+    <a:masterClrMapping/>
+  </p:clrMapOvr>
+  <p:timing>
+    <p:tnLst>
+      <p:par>
+        <p:cTn id="1" dur="indefinite" restart="never" nodeType="tmRoot"/>
+      </p:par>
+    </p:tnLst>
+  </p:timing>
+</p:sld>
+</file>
+
+<file path=ppt/slides/slide6.xml><?xml version="1.0" encoding="utf-8"?>
+<p:sld xmlns:a="http://schemas.openxmlformats.org/drawingml/2006/main" xmlns:r="http://schemas.openxmlformats.org/officeDocument/2006/relationships" xmlns:p="http://schemas.openxmlformats.org/presentationml/2006/main">
+  <p:cSld>
+    <p:spTree>
+      <p:nvGrpSpPr>
+        <p:cNvPr id="1" name=""/>
+        <p:cNvGrpSpPr/>
+        <p:nvPr/>
+      </p:nvGrpSpPr>
+      <p:grpSpPr>
+        <a:xfrm>
+          <a:off x="0" y="0"/>
+          <a:ext cx="0" cy="0"/>
+          <a:chOff x="0" y="0"/>
+          <a:chExt cx="0" cy="0"/>
+        </a:xfrm>
+      </p:grpSpPr>
+      <p:pic>
+        <p:nvPicPr>
+          <p:cNvPr id="6" name="Picture 5"/>
+          <p:cNvPicPr>
+            <a:picLocks noChangeAspect="1"/>
+          </p:cNvPicPr>
+          <p:nvPr/>
+        </p:nvPicPr>
+        <p:blipFill>
+          <a:blip r:embed="rId3"/>
+          <a:stretch>
+            <a:fillRect/>
+          </a:stretch>
+        </p:blipFill>
+        <p:spPr>
+          <a:xfrm>
+            <a:off x="1617009" y="679636"/>
+            <a:ext cx="5500074" cy="3092264"/>
+          </a:xfrm>
+          <a:prstGeom prst="rect">
+            <a:avLst/>
+          </a:prstGeom>
+        </p:spPr>
+      </p:pic>
+      <p:sp>
+        <p:nvSpPr>
+          <p:cNvPr id="4" name="Slide Number Placeholder 3"/>
+          <p:cNvSpPr>
+            <a:spLocks noGrp="1"/>
+          </p:cNvSpPr>
+          <p:nvPr>
+            <p:ph type="sldNum" sz="quarter" idx="10"/>
+          </p:nvPr>
+        </p:nvSpPr>
+        <p:spPr/>
+        <p:txBody>
+          <a:bodyPr/>
+          <a:lstStyle/>
+          <a:p>
+            <a:fld id="{4EACBA47-91FC-4F0F-98EF-AF8B449ABA17}" type="slidenum">
+              <a:rPr lang="nl-NL" noProof="0" smtClean="0"/>
+              <a:pPr/>
+              <a:t>6</a:t>
+            </a:fld>
+            <a:endParaRPr lang="nl-NL" noProof="0" dirty="0"/>
+          </a:p>
+        </p:txBody>
+      </p:sp>
+      <p:sp>
+        <p:nvSpPr>
+          <p:cNvPr id="3" name="Footer Placeholder 2"/>
+          <p:cNvSpPr>
+            <a:spLocks noGrp="1"/>
+          </p:cNvSpPr>
+          <p:nvPr>
+            <p:ph type="ftr" sz="quarter" idx="11"/>
+          </p:nvPr>
+        </p:nvSpPr>
+        <p:spPr>
+          <a:xfrm>
+            <a:off x="1884624" y="4692511"/>
+            <a:ext cx="6621144" cy="192360"/>
+          </a:xfrm>
+        </p:spPr>
+        <p:txBody>
+          <a:bodyPr/>
+          <a:lstStyle/>
+          <a:p>
+            <a:r>
+              <a:rPr lang="nl-NL" dirty="0" err="1"/>
+              <a:t>Akka,Net</a:t>
+            </a:r>
+            <a:r>
+              <a:rPr lang="nl-NL" dirty="0"/>
+              <a:t> Pizza Sessie</a:t>
+            </a:r>
+          </a:p>
+        </p:txBody>
+      </p:sp>
+      <p:sp>
+        <p:nvSpPr>
+          <p:cNvPr id="2" name="Title 1"/>
+          <p:cNvSpPr>
+            <a:spLocks noGrp="1"/>
+          </p:cNvSpPr>
+          <p:nvPr>
+            <p:ph type="title"/>
+          </p:nvPr>
+        </p:nvSpPr>
+        <p:spPr>
+          <a:xfrm>
+            <a:off x="285294" y="129454"/>
+            <a:ext cx="8460000" cy="685800"/>
+          </a:xfrm>
+        </p:spPr>
+        <p:txBody>
+          <a:bodyPr/>
+          <a:lstStyle/>
+          <a:p>
+            <a:r>
+              <a:rPr lang="nl-NL" dirty="0" smtClean="0"/>
+              <a:t>Actor Model</a:t>
+            </a:r>
+            <a:endParaRPr lang="nl-NL" dirty="0"/>
+          </a:p>
+        </p:txBody>
+      </p:sp>
+      <p:sp>
+        <p:nvSpPr>
+          <p:cNvPr id="5" name="Content Placeholder 2"/>
+          <p:cNvSpPr txBox="1">
+            <a:spLocks/>
+          </p:cNvSpPr>
+          <p:nvPr/>
+        </p:nvSpPr>
+        <p:spPr>
+          <a:xfrm>
+            <a:off x="246228" y="3543299"/>
+            <a:ext cx="10058400" cy="1703473"/>
+          </a:xfrm>
+          <a:prstGeom prst="rect">
+            <a:avLst/>
+          </a:prstGeom>
+        </p:spPr>
+        <p:txBody>
+          <a:bodyPr>
+            <a:normAutofit/>
+          </a:bodyPr>
+          <a:lstStyle>
+            <a:lvl1pPr marL="351000" indent="-351000" algn="l" defTabSz="685800" rtl="0" eaLnBrk="1" latinLnBrk="0" hangingPunct="1">
+              <a:lnSpc>
+                <a:spcPts val="2000"/>
+              </a:lnSpc>
+              <a:spcBef>
+                <a:spcPts val="0"/>
+              </a:spcBef>
+              <a:buFont typeface="Wingdings 3" pitchFamily="18" charset="2"/>
+              <a:buChar char=""/>
+              <a:tabLst/>
+              <a:defRPr sz="1800" b="1" kern="1200">
+                <a:solidFill>
+                  <a:schemeClr val="tx1"/>
+                </a:solidFill>
+                <a:latin typeface="+mn-lt"/>
+                <a:ea typeface="+mn-ea"/>
+                <a:cs typeface="+mn-cs"/>
+              </a:defRPr>
+            </a:lvl1pPr>
+            <a:lvl2pPr marL="675000" indent="-350044" algn="l" defTabSz="740569" rtl="0" eaLnBrk="1" latinLnBrk="0" hangingPunct="1">
+              <a:lnSpc>
+                <a:spcPts val="2000"/>
+              </a:lnSpc>
+              <a:spcBef>
+                <a:spcPts val="0"/>
+              </a:spcBef>
+              <a:buFont typeface="Wingdings 3" pitchFamily="18" charset="2"/>
+              <a:buChar char=""/>
+              <a:tabLst/>
+              <a:defRPr sz="1800" b="1" kern="1200">
+                <a:solidFill>
+                  <a:schemeClr val="tx1"/>
+                </a:solidFill>
+                <a:latin typeface="+mn-lt"/>
+                <a:ea typeface="+mn-ea"/>
+                <a:cs typeface="+mn-cs"/>
+              </a:defRPr>
+            </a:lvl2pPr>
+            <a:lvl3pPr marL="1010841" indent="-350044" algn="l" defTabSz="740569" rtl="0" eaLnBrk="1" latinLnBrk="0" hangingPunct="1">
+              <a:lnSpc>
+                <a:spcPts val="2000"/>
+              </a:lnSpc>
+              <a:spcBef>
+                <a:spcPts val="0"/>
+              </a:spcBef>
+              <a:buFont typeface="Century Gothic" pitchFamily="34" charset="0"/>
+              <a:buChar char="•"/>
+              <a:tabLst/>
+              <a:defRPr sz="1800" b="1" kern="1200">
+                <a:solidFill>
+                  <a:schemeClr val="tx1"/>
+                </a:solidFill>
+                <a:latin typeface="+mn-lt"/>
+                <a:ea typeface="+mn-ea"/>
+                <a:cs typeface="+mn-cs"/>
+              </a:defRPr>
+            </a:lvl3pPr>
+            <a:lvl4pPr marL="1345406" indent="-350044" algn="l" defTabSz="685800" rtl="0" eaLnBrk="1" latinLnBrk="0" hangingPunct="1">
+              <a:lnSpc>
+                <a:spcPts val="1800"/>
+              </a:lnSpc>
+              <a:spcBef>
+                <a:spcPts val="0"/>
+              </a:spcBef>
+              <a:buFont typeface="Century Gothic" pitchFamily="34" charset="0"/>
+              <a:buChar char="•"/>
+              <a:defRPr sz="1400" b="1" kern="1200">
+                <a:solidFill>
+                  <a:schemeClr val="tx1"/>
+                </a:solidFill>
+                <a:latin typeface="+mn-lt"/>
+                <a:ea typeface="+mn-ea"/>
+                <a:cs typeface="+mn-cs"/>
+              </a:defRPr>
+            </a:lvl4pPr>
+            <a:lvl5pPr marL="1687116" indent="-350044" algn="l" defTabSz="501254" rtl="0" eaLnBrk="1" latinLnBrk="0" hangingPunct="1">
+              <a:lnSpc>
+                <a:spcPts val="1800"/>
+              </a:lnSpc>
+              <a:spcBef>
+                <a:spcPts val="0"/>
+              </a:spcBef>
+              <a:buFont typeface="Century Gothic" pitchFamily="34" charset="0"/>
+              <a:buChar char="•"/>
+              <a:defRPr sz="1400" b="1" kern="1200">
+                <a:solidFill>
+                  <a:schemeClr val="tx1"/>
+                </a:solidFill>
+                <a:latin typeface="+mn-lt"/>
+                <a:ea typeface="+mn-ea"/>
+                <a:cs typeface="+mn-cs"/>
+              </a:defRPr>
+            </a:lvl5pPr>
+            <a:lvl6pPr marL="1885950" indent="-171450" algn="l" defTabSz="685800" rtl="0" eaLnBrk="1" latinLnBrk="0" hangingPunct="1">
+              <a:spcBef>
+                <a:spcPct val="20000"/>
+              </a:spcBef>
+              <a:buFont typeface="Arial" pitchFamily="34" charset="0"/>
+              <a:buChar char="•"/>
+              <a:defRPr sz="1500" kern="1200">
+                <a:solidFill>
+                  <a:schemeClr val="tx1"/>
+                </a:solidFill>
+                <a:latin typeface="+mn-lt"/>
+                <a:ea typeface="+mn-ea"/>
+                <a:cs typeface="+mn-cs"/>
+              </a:defRPr>
+            </a:lvl6pPr>
+            <a:lvl7pPr marL="2228850" indent="-171450" algn="l" defTabSz="685800" rtl="0" eaLnBrk="1" latinLnBrk="0" hangingPunct="1">
+              <a:spcBef>
+                <a:spcPct val="20000"/>
+              </a:spcBef>
+              <a:buFont typeface="Arial" pitchFamily="34" charset="0"/>
+              <a:buChar char="•"/>
+              <a:defRPr sz="1500" kern="1200">
+                <a:solidFill>
+                  <a:schemeClr val="tx1"/>
+                </a:solidFill>
+                <a:latin typeface="+mn-lt"/>
+                <a:ea typeface="+mn-ea"/>
+                <a:cs typeface="+mn-cs"/>
+              </a:defRPr>
+            </a:lvl7pPr>
+            <a:lvl8pPr marL="2571750" indent="-171450" algn="l" defTabSz="685800" rtl="0" eaLnBrk="1" latinLnBrk="0" hangingPunct="1">
+              <a:spcBef>
+                <a:spcPct val="20000"/>
+              </a:spcBef>
+              <a:buFont typeface="Arial" pitchFamily="34" charset="0"/>
+              <a:buChar char="•"/>
+              <a:defRPr sz="1500" kern="1200">
+                <a:solidFill>
+                  <a:schemeClr val="tx1"/>
+                </a:solidFill>
+                <a:latin typeface="+mn-lt"/>
+                <a:ea typeface="+mn-ea"/>
+                <a:cs typeface="+mn-cs"/>
+              </a:defRPr>
+            </a:lvl8pPr>
+            <a:lvl9pPr marL="2914650" indent="-171450" algn="l" defTabSz="685800" rtl="0" eaLnBrk="1" latinLnBrk="0" hangingPunct="1">
+              <a:spcBef>
+                <a:spcPct val="20000"/>
+              </a:spcBef>
+              <a:buFont typeface="Arial" pitchFamily="34" charset="0"/>
+              <a:buChar char="•"/>
+              <a:defRPr sz="1500" kern="1200">
+                <a:solidFill>
+                  <a:schemeClr val="tx1"/>
+                </a:solidFill>
+                <a:latin typeface="+mn-lt"/>
+                <a:ea typeface="+mn-ea"/>
+                <a:cs typeface="+mn-cs"/>
+              </a:defRPr>
+            </a:lvl9pPr>
+          </a:lstStyle>
+          <a:p>
+            <a:pPr marL="0" indent="0">
+              <a:lnSpc>
+                <a:spcPct val="100000"/>
+              </a:lnSpc>
+              <a:buNone/>
+            </a:pPr>
+            <a:r>
+              <a:rPr lang="nl-NL" dirty="0" smtClean="0"/>
+              <a:t>Gebruikt: </a:t>
+            </a:r>
+            <a:r>
+              <a:rPr lang="nl-NL" dirty="0" err="1" smtClean="0"/>
+              <a:t>Amazon’s</a:t>
+            </a:r>
+            <a:r>
+              <a:rPr lang="nl-NL" dirty="0" smtClean="0"/>
+              <a:t> </a:t>
+            </a:r>
+            <a:r>
+              <a:rPr lang="nl-NL" dirty="0" err="1"/>
+              <a:t>SimpleDb</a:t>
+            </a:r>
+            <a:r>
+              <a:rPr lang="nl-NL" dirty="0"/>
+              <a:t>, </a:t>
+            </a:r>
+            <a:r>
+              <a:rPr lang="nl-NL" dirty="0" err="1"/>
+              <a:t>RabbitMQ</a:t>
+            </a:r>
+            <a:r>
+              <a:rPr lang="nl-NL" dirty="0"/>
+              <a:t>, </a:t>
+            </a:r>
+            <a:r>
+              <a:rPr lang="nl-NL" dirty="0" err="1"/>
+              <a:t>Riak</a:t>
+            </a:r>
+            <a:r>
+              <a:rPr lang="nl-NL" dirty="0"/>
+              <a:t>, </a:t>
+            </a:r>
+            <a:r>
+              <a:rPr lang="nl-NL" dirty="0" err="1"/>
+              <a:t>CouchBase</a:t>
+            </a:r>
+            <a:r>
+              <a:rPr lang="nl-NL" dirty="0"/>
+              <a:t>, Goldman Sachs, </a:t>
+            </a:r>
+            <a:endParaRPr lang="nl-NL" dirty="0" smtClean="0"/>
+          </a:p>
+          <a:p>
+            <a:pPr marL="0" indent="0">
+              <a:lnSpc>
+                <a:spcPct val="100000"/>
+              </a:lnSpc>
+              <a:buNone/>
+            </a:pPr>
+            <a:r>
+              <a:rPr lang="nl-NL" dirty="0" smtClean="0"/>
+              <a:t>Motorola</a:t>
+            </a:r>
+            <a:r>
+              <a:rPr lang="nl-NL" dirty="0"/>
+              <a:t>, </a:t>
+            </a:r>
+            <a:r>
+              <a:rPr lang="nl-NL" dirty="0" smtClean="0"/>
+              <a:t>Blizzard </a:t>
+            </a:r>
+            <a:r>
+              <a:rPr lang="nl-NL" dirty="0"/>
+              <a:t>Games, Cisco, eBay, Credit Suisse, AMN Healthcare, </a:t>
+            </a:r>
+            <a:endParaRPr lang="nl-NL" dirty="0" smtClean="0"/>
+          </a:p>
+          <a:p>
+            <a:pPr marL="0" indent="0">
+              <a:lnSpc>
+                <a:spcPct val="100000"/>
+              </a:lnSpc>
+              <a:buNone/>
+            </a:pPr>
+            <a:r>
+              <a:rPr lang="nl-NL" dirty="0" smtClean="0"/>
+              <a:t>Bank </a:t>
+            </a:r>
+            <a:r>
+              <a:rPr lang="nl-NL" dirty="0"/>
+              <a:t>of America, McGraw Hill Financial</a:t>
+            </a:r>
+          </a:p>
+          <a:p>
+            <a:pPr marL="0" indent="0">
+              <a:lnSpc>
+                <a:spcPct val="100000"/>
+              </a:lnSpc>
+              <a:buNone/>
+            </a:pPr>
+            <a:endParaRPr lang="nl-NL" dirty="0" smtClean="0"/>
+          </a:p>
+          <a:p>
+            <a:pPr>
+              <a:lnSpc>
+                <a:spcPct val="100000"/>
+              </a:lnSpc>
+              <a:buFont typeface="Wingdings" panose="05000000000000000000" pitchFamily="2" charset="2"/>
+              <a:buChar char="Ø"/>
+            </a:pPr>
+            <a:endParaRPr lang="nl-NL" dirty="0"/>
+          </a:p>
+          <a:p>
+            <a:pPr marL="0" indent="0">
+              <a:lnSpc>
+                <a:spcPct val="100000"/>
+              </a:lnSpc>
+              <a:buNone/>
+            </a:pPr>
+            <a:endParaRPr lang="nl-NL" dirty="0"/>
+          </a:p>
+        </p:txBody>
+      </p:sp>
+    </p:spTree>
+    <p:extLst>
+      <p:ext uri="{BB962C8B-B14F-4D97-AF65-F5344CB8AC3E}">
+        <p14:creationId xmlns:p14="http://schemas.microsoft.com/office/powerpoint/2010/main" val="226216794"/>
+      </p:ext>
+    </p:extLst>
+  </p:cSld>
+  <p:clrMapOvr>
+    <a:masterClrMapping/>
+  </p:clrMapOvr>
+  <p:timing>
+    <p:tnLst>
+      <p:par>
+        <p:cTn id="1" dur="indefinite" restart="never" nodeType="tmRoot"/>
+      </p:par>
+    </p:tnLst>
+  </p:timing>
+</p:sld>
+</file>
+
+<file path=ppt/slides/slide7.xml><?xml version="1.0" encoding="utf-8"?>
+<p:sld xmlns:a="http://schemas.openxmlformats.org/drawingml/2006/main" xmlns:r="http://schemas.openxmlformats.org/officeDocument/2006/relationships" xmlns:p="http://schemas.openxmlformats.org/presentationml/2006/main">
+  <p:cSld>
+    <p:spTree>
+      <p:nvGrpSpPr>
+        <p:cNvPr id="1" name=""/>
+        <p:cNvGrpSpPr/>
+        <p:nvPr/>
+      </p:nvGrpSpPr>
+      <p:grpSpPr>
+        <a:xfrm>
+          <a:off x="0" y="0"/>
+          <a:ext cx="0" cy="0"/>
+          <a:chOff x="0" y="0"/>
+          <a:chExt cx="0" cy="0"/>
+        </a:xfrm>
+      </p:grpSpPr>
+      <p:sp>
+        <p:nvSpPr>
+          <p:cNvPr id="4" name="Slide Number Placeholder 3"/>
+          <p:cNvSpPr>
+            <a:spLocks noGrp="1"/>
+          </p:cNvSpPr>
+          <p:nvPr>
+            <p:ph type="sldNum" sz="quarter" idx="10"/>
+          </p:nvPr>
+        </p:nvSpPr>
+        <p:spPr/>
+        <p:txBody>
+          <a:bodyPr/>
+          <a:lstStyle/>
+          <a:p>
+            <a:fld id="{4EACBA47-91FC-4F0F-98EF-AF8B449ABA17}" type="slidenum">
+              <a:rPr lang="nl-NL" noProof="0" smtClean="0"/>
+              <a:pPr/>
+              <a:t>7</a:t>
+            </a:fld>
+            <a:endParaRPr lang="nl-NL" noProof="0" dirty="0"/>
+          </a:p>
+        </p:txBody>
+      </p:sp>
+      <p:sp>
+        <p:nvSpPr>
+          <p:cNvPr id="3" name="Footer Placeholder 2"/>
+          <p:cNvSpPr>
+            <a:spLocks noGrp="1"/>
+          </p:cNvSpPr>
+          <p:nvPr>
+            <p:ph type="ftr" sz="quarter" idx="11"/>
+          </p:nvPr>
+        </p:nvSpPr>
+        <p:spPr>
+          <a:xfrm>
+            <a:off x="1884624" y="4692511"/>
+            <a:ext cx="6621144" cy="192360"/>
+          </a:xfrm>
+        </p:spPr>
+        <p:txBody>
+          <a:bodyPr/>
+          <a:lstStyle/>
+          <a:p>
+            <a:r>
+              <a:rPr lang="nl-NL" dirty="0" err="1"/>
+              <a:t>Akka,Net</a:t>
+            </a:r>
+            <a:r>
+              <a:rPr lang="nl-NL" dirty="0"/>
+              <a:t> Pizza Sessie</a:t>
+            </a:r>
+          </a:p>
+        </p:txBody>
+      </p:sp>
+      <p:sp>
+        <p:nvSpPr>
+          <p:cNvPr id="2" name="Title 1"/>
+          <p:cNvSpPr>
+            <a:spLocks noGrp="1"/>
+          </p:cNvSpPr>
+          <p:nvPr>
+            <p:ph type="title"/>
+          </p:nvPr>
+        </p:nvSpPr>
+        <p:spPr>
+          <a:xfrm>
+            <a:off x="285294" y="129454"/>
+            <a:ext cx="8460000" cy="685800"/>
+          </a:xfrm>
+        </p:spPr>
+        <p:txBody>
+          <a:bodyPr/>
+          <a:lstStyle/>
+          <a:p>
+            <a:r>
+              <a:rPr lang="nl-NL" dirty="0" err="1" smtClean="0"/>
+              <a:t>One</a:t>
+            </a:r>
+            <a:r>
+              <a:rPr lang="nl-NL" dirty="0" smtClean="0"/>
+              <a:t>-For-</a:t>
+            </a:r>
+            <a:r>
+              <a:rPr lang="nl-NL" dirty="0" err="1" smtClean="0"/>
+              <a:t>One</a:t>
+            </a:r>
+            <a:r>
+              <a:rPr lang="nl-NL" dirty="0" smtClean="0"/>
+              <a:t> </a:t>
+            </a:r>
+            <a:r>
+              <a:rPr lang="nl-NL" dirty="0" err="1" smtClean="0"/>
+              <a:t>Strategy</a:t>
+            </a:r>
+            <a:endParaRPr lang="nl-NL" dirty="0"/>
+          </a:p>
+        </p:txBody>
+      </p:sp>
+      <p:sp>
+        <p:nvSpPr>
+          <p:cNvPr id="5" name="Content Placeholder 2"/>
+          <p:cNvSpPr txBox="1">
+            <a:spLocks/>
+          </p:cNvSpPr>
+          <p:nvPr/>
+        </p:nvSpPr>
+        <p:spPr>
+          <a:xfrm>
+            <a:off x="246228" y="3872753"/>
+            <a:ext cx="10058400" cy="1374019"/>
+          </a:xfrm>
+          <a:prstGeom prst="rect">
+            <a:avLst/>
+          </a:prstGeom>
+        </p:spPr>
+        <p:txBody>
+          <a:bodyPr>
+            <a:normAutofit/>
+          </a:bodyPr>
+          <a:lstStyle>
+            <a:lvl1pPr marL="351000" indent="-351000" algn="l" defTabSz="685800" rtl="0" eaLnBrk="1" latinLnBrk="0" hangingPunct="1">
+              <a:lnSpc>
+                <a:spcPts val="2000"/>
+              </a:lnSpc>
+              <a:spcBef>
+                <a:spcPts val="0"/>
+              </a:spcBef>
+              <a:buFont typeface="Wingdings 3" pitchFamily="18" charset="2"/>
+              <a:buChar char=""/>
+              <a:tabLst/>
+              <a:defRPr sz="1800" b="1" kern="1200">
+                <a:solidFill>
+                  <a:schemeClr val="tx1"/>
+                </a:solidFill>
+                <a:latin typeface="+mn-lt"/>
+                <a:ea typeface="+mn-ea"/>
+                <a:cs typeface="+mn-cs"/>
+              </a:defRPr>
+            </a:lvl1pPr>
+            <a:lvl2pPr marL="675000" indent="-350044" algn="l" defTabSz="740569" rtl="0" eaLnBrk="1" latinLnBrk="0" hangingPunct="1">
+              <a:lnSpc>
+                <a:spcPts val="2000"/>
+              </a:lnSpc>
+              <a:spcBef>
+                <a:spcPts val="0"/>
+              </a:spcBef>
+              <a:buFont typeface="Wingdings 3" pitchFamily="18" charset="2"/>
+              <a:buChar char=""/>
+              <a:tabLst/>
+              <a:defRPr sz="1800" b="1" kern="1200">
+                <a:solidFill>
+                  <a:schemeClr val="tx1"/>
+                </a:solidFill>
+                <a:latin typeface="+mn-lt"/>
+                <a:ea typeface="+mn-ea"/>
+                <a:cs typeface="+mn-cs"/>
+              </a:defRPr>
+            </a:lvl2pPr>
+            <a:lvl3pPr marL="1010841" indent="-350044" algn="l" defTabSz="740569" rtl="0" eaLnBrk="1" latinLnBrk="0" hangingPunct="1">
+              <a:lnSpc>
+                <a:spcPts val="2000"/>
+              </a:lnSpc>
+              <a:spcBef>
+                <a:spcPts val="0"/>
+              </a:spcBef>
+              <a:buFont typeface="Century Gothic" pitchFamily="34" charset="0"/>
+              <a:buChar char="•"/>
+              <a:tabLst/>
+              <a:defRPr sz="1800" b="1" kern="1200">
+                <a:solidFill>
+                  <a:schemeClr val="tx1"/>
+                </a:solidFill>
+                <a:latin typeface="+mn-lt"/>
+                <a:ea typeface="+mn-ea"/>
+                <a:cs typeface="+mn-cs"/>
+              </a:defRPr>
+            </a:lvl3pPr>
+            <a:lvl4pPr marL="1345406" indent="-350044" algn="l" defTabSz="685800" rtl="0" eaLnBrk="1" latinLnBrk="0" hangingPunct="1">
+              <a:lnSpc>
+                <a:spcPts val="1800"/>
+              </a:lnSpc>
+              <a:spcBef>
+                <a:spcPts val="0"/>
+              </a:spcBef>
+              <a:buFont typeface="Century Gothic" pitchFamily="34" charset="0"/>
+              <a:buChar char="•"/>
+              <a:defRPr sz="1400" b="1" kern="1200">
+                <a:solidFill>
+                  <a:schemeClr val="tx1"/>
+                </a:solidFill>
+                <a:latin typeface="+mn-lt"/>
+                <a:ea typeface="+mn-ea"/>
+                <a:cs typeface="+mn-cs"/>
+              </a:defRPr>
+            </a:lvl4pPr>
+            <a:lvl5pPr marL="1687116" indent="-350044" algn="l" defTabSz="501254" rtl="0" eaLnBrk="1" latinLnBrk="0" hangingPunct="1">
+              <a:lnSpc>
+                <a:spcPts val="1800"/>
+              </a:lnSpc>
+              <a:spcBef>
+                <a:spcPts val="0"/>
+              </a:spcBef>
+              <a:buFont typeface="Century Gothic" pitchFamily="34" charset="0"/>
+              <a:buChar char="•"/>
+              <a:defRPr sz="1400" b="1" kern="1200">
+                <a:solidFill>
+                  <a:schemeClr val="tx1"/>
+                </a:solidFill>
+                <a:latin typeface="+mn-lt"/>
+                <a:ea typeface="+mn-ea"/>
+                <a:cs typeface="+mn-cs"/>
+              </a:defRPr>
+            </a:lvl5pPr>
+            <a:lvl6pPr marL="1885950" indent="-171450" algn="l" defTabSz="685800" rtl="0" eaLnBrk="1" latinLnBrk="0" hangingPunct="1">
+              <a:spcBef>
+                <a:spcPct val="20000"/>
+              </a:spcBef>
+              <a:buFont typeface="Arial" pitchFamily="34" charset="0"/>
+              <a:buChar char="•"/>
+              <a:defRPr sz="1500" kern="1200">
+                <a:solidFill>
+                  <a:schemeClr val="tx1"/>
+                </a:solidFill>
+                <a:latin typeface="+mn-lt"/>
+                <a:ea typeface="+mn-ea"/>
+                <a:cs typeface="+mn-cs"/>
+              </a:defRPr>
+            </a:lvl6pPr>
+            <a:lvl7pPr marL="2228850" indent="-171450" algn="l" defTabSz="685800" rtl="0" eaLnBrk="1" latinLnBrk="0" hangingPunct="1">
+              <a:spcBef>
+                <a:spcPct val="20000"/>
+              </a:spcBef>
+              <a:buFont typeface="Arial" pitchFamily="34" charset="0"/>
+              <a:buChar char="•"/>
+              <a:defRPr sz="1500" kern="1200">
+                <a:solidFill>
+                  <a:schemeClr val="tx1"/>
+                </a:solidFill>
+                <a:latin typeface="+mn-lt"/>
+                <a:ea typeface="+mn-ea"/>
+                <a:cs typeface="+mn-cs"/>
+              </a:defRPr>
+            </a:lvl7pPr>
+            <a:lvl8pPr marL="2571750" indent="-171450" algn="l" defTabSz="685800" rtl="0" eaLnBrk="1" latinLnBrk="0" hangingPunct="1">
+              <a:spcBef>
+                <a:spcPct val="20000"/>
+              </a:spcBef>
+              <a:buFont typeface="Arial" pitchFamily="34" charset="0"/>
+              <a:buChar char="•"/>
+              <a:defRPr sz="1500" kern="1200">
+                <a:solidFill>
+                  <a:schemeClr val="tx1"/>
+                </a:solidFill>
+                <a:latin typeface="+mn-lt"/>
+                <a:ea typeface="+mn-ea"/>
+                <a:cs typeface="+mn-cs"/>
+              </a:defRPr>
+            </a:lvl8pPr>
+            <a:lvl9pPr marL="2914650" indent="-171450" algn="l" defTabSz="685800" rtl="0" eaLnBrk="1" latinLnBrk="0" hangingPunct="1">
+              <a:spcBef>
+                <a:spcPct val="20000"/>
+              </a:spcBef>
+              <a:buFont typeface="Arial" pitchFamily="34" charset="0"/>
+              <a:buChar char="•"/>
+              <a:defRPr sz="1500" kern="1200">
+                <a:solidFill>
+                  <a:schemeClr val="tx1"/>
+                </a:solidFill>
+                <a:latin typeface="+mn-lt"/>
+                <a:ea typeface="+mn-ea"/>
+                <a:cs typeface="+mn-cs"/>
+              </a:defRPr>
+            </a:lvl9pPr>
+          </a:lstStyle>
+          <a:p>
+            <a:pPr marL="0" indent="0">
+              <a:lnSpc>
+                <a:spcPct val="100000"/>
+              </a:lnSpc>
+              <a:buNone/>
+            </a:pPr>
+            <a:r>
+              <a:rPr lang="nl-NL" dirty="0" smtClean="0"/>
+              <a:t>Default</a:t>
+            </a:r>
+          </a:p>
+          <a:p>
+            <a:pPr marL="0" indent="0">
+              <a:lnSpc>
+                <a:spcPct val="100000"/>
+              </a:lnSpc>
+              <a:buNone/>
+            </a:pPr>
+            <a:r>
+              <a:rPr lang="nl-NL" dirty="0" smtClean="0"/>
+              <a:t>Herstart alleen het kind met de error</a:t>
+            </a:r>
+          </a:p>
+          <a:p>
+            <a:pPr>
+              <a:lnSpc>
+                <a:spcPct val="100000"/>
+              </a:lnSpc>
+              <a:buFont typeface="Wingdings" panose="05000000000000000000" pitchFamily="2" charset="2"/>
+              <a:buChar char="Ø"/>
+            </a:pPr>
+            <a:endParaRPr lang="nl-NL" dirty="0"/>
+          </a:p>
+          <a:p>
+            <a:pPr marL="0" indent="0">
+              <a:lnSpc>
+                <a:spcPct val="100000"/>
+              </a:lnSpc>
+              <a:buNone/>
+            </a:pPr>
+            <a:endParaRPr lang="nl-NL" dirty="0"/>
+          </a:p>
+        </p:txBody>
+      </p:sp>
+      <p:pic>
+        <p:nvPicPr>
+          <p:cNvPr id="7" name="Picture 6"/>
+          <p:cNvPicPr>
+            <a:picLocks noChangeAspect="1"/>
+          </p:cNvPicPr>
+          <p:nvPr/>
+        </p:nvPicPr>
+        <p:blipFill>
+          <a:blip r:embed="rId3"/>
+          <a:stretch>
+            <a:fillRect/>
+          </a:stretch>
+        </p:blipFill>
+        <p:spPr>
+          <a:xfrm>
+            <a:off x="1267386" y="719978"/>
+            <a:ext cx="5785597" cy="3252791"/>
+          </a:xfrm>
+          <a:prstGeom prst="rect">
+            <a:avLst/>
+          </a:prstGeom>
+        </p:spPr>
+      </p:pic>
+    </p:spTree>
+    <p:extLst>
+      <p:ext uri="{BB962C8B-B14F-4D97-AF65-F5344CB8AC3E}">
+        <p14:creationId xmlns:p14="http://schemas.microsoft.com/office/powerpoint/2010/main" val="3453877586"/>
+      </p:ext>
+    </p:extLst>
+  </p:cSld>
+  <p:clrMapOvr>
+    <a:masterClrMapping/>
+  </p:clrMapOvr>
+  <p:timing>
+    <p:tnLst>
+      <p:par>
+        <p:cTn id="1" dur="indefinite" restart="never" nodeType="tmRoot"/>
+      </p:par>
+    </p:tnLst>
+  </p:timing>
+</p:sld>
+</file>
+
+<file path=ppt/slides/slide8.xml><?xml version="1.0" encoding="utf-8"?>
+<p:sld xmlns:a="http://schemas.openxmlformats.org/drawingml/2006/main" xmlns:r="http://schemas.openxmlformats.org/officeDocument/2006/relationships" xmlns:p="http://schemas.openxmlformats.org/presentationml/2006/main">
+  <p:cSld>
+    <p:spTree>
+      <p:nvGrpSpPr>
+        <p:cNvPr id="1" name=""/>
+        <p:cNvGrpSpPr/>
+        <p:nvPr/>
+      </p:nvGrpSpPr>
+      <p:grpSpPr>
+        <a:xfrm>
+          <a:off x="0" y="0"/>
+          <a:ext cx="0" cy="0"/>
+          <a:chOff x="0" y="0"/>
+          <a:chExt cx="0" cy="0"/>
+        </a:xfrm>
+      </p:grpSpPr>
+      <p:sp>
+        <p:nvSpPr>
+          <p:cNvPr id="4" name="Slide Number Placeholder 3"/>
+          <p:cNvSpPr>
+            <a:spLocks noGrp="1"/>
+          </p:cNvSpPr>
+          <p:nvPr>
+            <p:ph type="sldNum" sz="quarter" idx="10"/>
+          </p:nvPr>
+        </p:nvSpPr>
+        <p:spPr/>
+        <p:txBody>
+          <a:bodyPr/>
+          <a:lstStyle/>
+          <a:p>
+            <a:fld id="{4EACBA47-91FC-4F0F-98EF-AF8B449ABA17}" type="slidenum">
+              <a:rPr lang="nl-NL" noProof="0" smtClean="0"/>
+              <a:pPr/>
+              <a:t>8</a:t>
+            </a:fld>
+            <a:endParaRPr lang="nl-NL" noProof="0" dirty="0"/>
+          </a:p>
+        </p:txBody>
+      </p:sp>
+      <p:sp>
+        <p:nvSpPr>
+          <p:cNvPr id="3" name="Footer Placeholder 2"/>
+          <p:cNvSpPr>
+            <a:spLocks noGrp="1"/>
+          </p:cNvSpPr>
+          <p:nvPr>
+            <p:ph type="ftr" sz="quarter" idx="11"/>
+          </p:nvPr>
+        </p:nvSpPr>
+        <p:spPr>
+          <a:xfrm>
+            <a:off x="1884624" y="4692511"/>
+            <a:ext cx="6621144" cy="192360"/>
+          </a:xfrm>
+        </p:spPr>
+        <p:txBody>
+          <a:bodyPr/>
+          <a:lstStyle/>
+          <a:p>
+            <a:r>
+              <a:rPr lang="nl-NL" dirty="0" err="1"/>
+              <a:t>Akka,Net</a:t>
+            </a:r>
+            <a:r>
+              <a:rPr lang="nl-NL" dirty="0"/>
+              <a:t> Pizza Sessie</a:t>
+            </a:r>
+          </a:p>
+        </p:txBody>
+      </p:sp>
+      <p:sp>
+        <p:nvSpPr>
+          <p:cNvPr id="2" name="Title 1"/>
+          <p:cNvSpPr>
+            <a:spLocks noGrp="1"/>
+          </p:cNvSpPr>
+          <p:nvPr>
+            <p:ph type="title"/>
+          </p:nvPr>
+        </p:nvSpPr>
+        <p:spPr>
+          <a:xfrm>
+            <a:off x="285294" y="129454"/>
+            <a:ext cx="8460000" cy="685800"/>
+          </a:xfrm>
+        </p:spPr>
+        <p:txBody>
+          <a:bodyPr/>
+          <a:lstStyle/>
+          <a:p>
+            <a:r>
+              <a:rPr lang="nl-NL" dirty="0" err="1" smtClean="0"/>
+              <a:t>All</a:t>
+            </a:r>
+            <a:r>
+              <a:rPr lang="nl-NL" dirty="0" smtClean="0"/>
+              <a:t>-For-</a:t>
+            </a:r>
+            <a:r>
+              <a:rPr lang="nl-NL" dirty="0" err="1" smtClean="0"/>
+              <a:t>One</a:t>
+            </a:r>
+            <a:r>
+              <a:rPr lang="nl-NL" dirty="0" smtClean="0"/>
+              <a:t> </a:t>
+            </a:r>
+            <a:r>
+              <a:rPr lang="nl-NL" dirty="0" err="1" smtClean="0"/>
+              <a:t>Strategy</a:t>
+            </a:r>
+            <a:endParaRPr lang="nl-NL" dirty="0"/>
+          </a:p>
+        </p:txBody>
+      </p:sp>
+      <p:sp>
+        <p:nvSpPr>
+          <p:cNvPr id="5" name="Content Placeholder 2"/>
+          <p:cNvSpPr txBox="1">
+            <a:spLocks/>
+          </p:cNvSpPr>
+          <p:nvPr/>
+        </p:nvSpPr>
+        <p:spPr>
+          <a:xfrm>
+            <a:off x="246228" y="3872753"/>
+            <a:ext cx="10058400" cy="1374019"/>
+          </a:xfrm>
+          <a:prstGeom prst="rect">
+            <a:avLst/>
+          </a:prstGeom>
+        </p:spPr>
+        <p:txBody>
+          <a:bodyPr>
+            <a:normAutofit/>
+          </a:bodyPr>
+          <a:lstStyle>
+            <a:lvl1pPr marL="351000" indent="-351000" algn="l" defTabSz="685800" rtl="0" eaLnBrk="1" latinLnBrk="0" hangingPunct="1">
+              <a:lnSpc>
+                <a:spcPts val="2000"/>
+              </a:lnSpc>
+              <a:spcBef>
+                <a:spcPts val="0"/>
+              </a:spcBef>
+              <a:buFont typeface="Wingdings 3" pitchFamily="18" charset="2"/>
+              <a:buChar char=""/>
+              <a:tabLst/>
+              <a:defRPr sz="1800" b="1" kern="1200">
+                <a:solidFill>
+                  <a:schemeClr val="tx1"/>
+                </a:solidFill>
+                <a:latin typeface="+mn-lt"/>
+                <a:ea typeface="+mn-ea"/>
+                <a:cs typeface="+mn-cs"/>
+              </a:defRPr>
+            </a:lvl1pPr>
+            <a:lvl2pPr marL="675000" indent="-350044" algn="l" defTabSz="740569" rtl="0" eaLnBrk="1" latinLnBrk="0" hangingPunct="1">
+              <a:lnSpc>
+                <a:spcPts val="2000"/>
+              </a:lnSpc>
+              <a:spcBef>
+                <a:spcPts val="0"/>
+              </a:spcBef>
+              <a:buFont typeface="Wingdings 3" pitchFamily="18" charset="2"/>
+              <a:buChar char=""/>
+              <a:tabLst/>
+              <a:defRPr sz="1800" b="1" kern="1200">
+                <a:solidFill>
+                  <a:schemeClr val="tx1"/>
+                </a:solidFill>
+                <a:latin typeface="+mn-lt"/>
+                <a:ea typeface="+mn-ea"/>
+                <a:cs typeface="+mn-cs"/>
+              </a:defRPr>
+            </a:lvl2pPr>
+            <a:lvl3pPr marL="1010841" indent="-350044" algn="l" defTabSz="740569" rtl="0" eaLnBrk="1" latinLnBrk="0" hangingPunct="1">
+              <a:lnSpc>
+                <a:spcPts val="2000"/>
+              </a:lnSpc>
+              <a:spcBef>
+                <a:spcPts val="0"/>
+              </a:spcBef>
+              <a:buFont typeface="Century Gothic" pitchFamily="34" charset="0"/>
+              <a:buChar char="•"/>
+              <a:tabLst/>
+              <a:defRPr sz="1800" b="1" kern="1200">
+                <a:solidFill>
+                  <a:schemeClr val="tx1"/>
+                </a:solidFill>
+                <a:latin typeface="+mn-lt"/>
+                <a:ea typeface="+mn-ea"/>
+                <a:cs typeface="+mn-cs"/>
+              </a:defRPr>
+            </a:lvl3pPr>
+            <a:lvl4pPr marL="1345406" indent="-350044" algn="l" defTabSz="685800" rtl="0" eaLnBrk="1" latinLnBrk="0" hangingPunct="1">
+              <a:lnSpc>
+                <a:spcPts val="1800"/>
+              </a:lnSpc>
+              <a:spcBef>
+                <a:spcPts val="0"/>
+              </a:spcBef>
+              <a:buFont typeface="Century Gothic" pitchFamily="34" charset="0"/>
+              <a:buChar char="•"/>
+              <a:defRPr sz="1400" b="1" kern="1200">
+                <a:solidFill>
+                  <a:schemeClr val="tx1"/>
+                </a:solidFill>
+                <a:latin typeface="+mn-lt"/>
+                <a:ea typeface="+mn-ea"/>
+                <a:cs typeface="+mn-cs"/>
+              </a:defRPr>
+            </a:lvl4pPr>
+            <a:lvl5pPr marL="1687116" indent="-350044" algn="l" defTabSz="501254" rtl="0" eaLnBrk="1" latinLnBrk="0" hangingPunct="1">
+              <a:lnSpc>
+                <a:spcPts val="1800"/>
+              </a:lnSpc>
+              <a:spcBef>
+                <a:spcPts val="0"/>
+              </a:spcBef>
+              <a:buFont typeface="Century Gothic" pitchFamily="34" charset="0"/>
+              <a:buChar char="•"/>
+              <a:defRPr sz="1400" b="1" kern="1200">
+                <a:solidFill>
+                  <a:schemeClr val="tx1"/>
+                </a:solidFill>
+                <a:latin typeface="+mn-lt"/>
+                <a:ea typeface="+mn-ea"/>
+                <a:cs typeface="+mn-cs"/>
+              </a:defRPr>
+            </a:lvl5pPr>
+            <a:lvl6pPr marL="1885950" indent="-171450" algn="l" defTabSz="685800" rtl="0" eaLnBrk="1" latinLnBrk="0" hangingPunct="1">
+              <a:spcBef>
+                <a:spcPct val="20000"/>
+              </a:spcBef>
+              <a:buFont typeface="Arial" pitchFamily="34" charset="0"/>
+              <a:buChar char="•"/>
+              <a:defRPr sz="1500" kern="1200">
+                <a:solidFill>
+                  <a:schemeClr val="tx1"/>
+                </a:solidFill>
+                <a:latin typeface="+mn-lt"/>
+                <a:ea typeface="+mn-ea"/>
+                <a:cs typeface="+mn-cs"/>
+              </a:defRPr>
+            </a:lvl6pPr>
+            <a:lvl7pPr marL="2228850" indent="-171450" algn="l" defTabSz="685800" rtl="0" eaLnBrk="1" latinLnBrk="0" hangingPunct="1">
+              <a:spcBef>
+                <a:spcPct val="20000"/>
+              </a:spcBef>
+              <a:buFont typeface="Arial" pitchFamily="34" charset="0"/>
+              <a:buChar char="•"/>
+              <a:defRPr sz="1500" kern="1200">
+                <a:solidFill>
+                  <a:schemeClr val="tx1"/>
+                </a:solidFill>
+                <a:latin typeface="+mn-lt"/>
+                <a:ea typeface="+mn-ea"/>
+                <a:cs typeface="+mn-cs"/>
+              </a:defRPr>
+            </a:lvl7pPr>
+            <a:lvl8pPr marL="2571750" indent="-171450" algn="l" defTabSz="685800" rtl="0" eaLnBrk="1" latinLnBrk="0" hangingPunct="1">
+              <a:spcBef>
+                <a:spcPct val="20000"/>
+              </a:spcBef>
+              <a:buFont typeface="Arial" pitchFamily="34" charset="0"/>
+              <a:buChar char="•"/>
+              <a:defRPr sz="1500" kern="1200">
+                <a:solidFill>
+                  <a:schemeClr val="tx1"/>
+                </a:solidFill>
+                <a:latin typeface="+mn-lt"/>
+                <a:ea typeface="+mn-ea"/>
+                <a:cs typeface="+mn-cs"/>
+              </a:defRPr>
+            </a:lvl8pPr>
+            <a:lvl9pPr marL="2914650" indent="-171450" algn="l" defTabSz="685800" rtl="0" eaLnBrk="1" latinLnBrk="0" hangingPunct="1">
+              <a:spcBef>
+                <a:spcPct val="20000"/>
+              </a:spcBef>
+              <a:buFont typeface="Arial" pitchFamily="34" charset="0"/>
+              <a:buChar char="•"/>
+              <a:defRPr sz="1500" kern="1200">
+                <a:solidFill>
+                  <a:schemeClr val="tx1"/>
+                </a:solidFill>
+                <a:latin typeface="+mn-lt"/>
+                <a:ea typeface="+mn-ea"/>
+                <a:cs typeface="+mn-cs"/>
+              </a:defRPr>
+            </a:lvl9pPr>
+          </a:lstStyle>
+          <a:p>
+            <a:pPr marL="0" indent="0">
+              <a:lnSpc>
+                <a:spcPct val="100000"/>
+              </a:lnSpc>
+              <a:buNone/>
+            </a:pPr>
+            <a:endParaRPr lang="nl-NL" dirty="0" smtClean="0"/>
+          </a:p>
+          <a:p>
+            <a:pPr marL="0" indent="0">
+              <a:lnSpc>
+                <a:spcPct val="100000"/>
+              </a:lnSpc>
+              <a:buNone/>
+            </a:pPr>
+            <a:r>
+              <a:rPr lang="nl-NL" dirty="0" smtClean="0"/>
+              <a:t>Herstart het kind met de error maar ook zijn </a:t>
+            </a:r>
+            <a:r>
+              <a:rPr lang="nl-NL" dirty="0" err="1" smtClean="0"/>
+              <a:t>siblings</a:t>
+            </a:r>
+            <a:endParaRPr lang="nl-NL" dirty="0" smtClean="0"/>
+          </a:p>
+          <a:p>
+            <a:pPr>
+              <a:lnSpc>
+                <a:spcPct val="100000"/>
+              </a:lnSpc>
+              <a:buFont typeface="Wingdings" panose="05000000000000000000" pitchFamily="2" charset="2"/>
+              <a:buChar char="Ø"/>
+            </a:pPr>
+            <a:endParaRPr lang="nl-NL" dirty="0"/>
+          </a:p>
+          <a:p>
+            <a:pPr marL="0" indent="0">
+              <a:lnSpc>
+                <a:spcPct val="100000"/>
+              </a:lnSpc>
+              <a:buNone/>
+            </a:pPr>
+            <a:endParaRPr lang="nl-NL" dirty="0"/>
+          </a:p>
+        </p:txBody>
+      </p:sp>
+      <p:pic>
+        <p:nvPicPr>
+          <p:cNvPr id="6" name="Picture 5"/>
+          <p:cNvPicPr>
+            <a:picLocks noChangeAspect="1"/>
+          </p:cNvPicPr>
+          <p:nvPr/>
+        </p:nvPicPr>
+        <p:blipFill>
+          <a:blip r:embed="rId3">
+            <a:extLst>
+              <a:ext uri="{28A0092B-C50C-407E-A947-70E740481C1C}">
+                <a14:useLocalDpi xmlns:a14="http://schemas.microsoft.com/office/drawing/2010/main" val="0"/>
+              </a:ext>
+            </a:extLst>
+          </a:blip>
+          <a:stretch>
+            <a:fillRect/>
+          </a:stretch>
+        </p:blipFill>
+        <p:spPr>
+          <a:xfrm>
+            <a:off x="1737434" y="815254"/>
+            <a:ext cx="6088754" cy="3423233"/>
+          </a:xfrm>
+          <a:prstGeom prst="rect">
+            <a:avLst/>
+          </a:prstGeom>
+        </p:spPr>
+      </p:pic>
+    </p:spTree>
+    <p:extLst>
+      <p:ext uri="{BB962C8B-B14F-4D97-AF65-F5344CB8AC3E}">
+        <p14:creationId xmlns:p14="http://schemas.microsoft.com/office/powerpoint/2010/main" val="114686455"/>
+      </p:ext>
+    </p:extLst>
+  </p:cSld>
+  <p:clrMapOvr>
+    <a:masterClrMapping/>
+  </p:clrMapOvr>
+  <p:timing>
+    <p:tnLst>
+      <p:par>
+        <p:cTn id="1" dur="indefinite" restart="never" nodeType="tmRoot"/>
+      </p:par>
+    </p:tnLst>
+  </p:timing>
+</p:sld>
+</file>
+
+<file path=ppt/slides/slide9.xml><?xml version="1.0" encoding="utf-8"?>
+<p:sld xmlns:a="http://schemas.openxmlformats.org/drawingml/2006/main" xmlns:r="http://schemas.openxmlformats.org/officeDocument/2006/relationships" xmlns:p="http://schemas.openxmlformats.org/presentationml/2006/main">
+  <p:cSld>
+    <p:spTree>
+      <p:nvGrpSpPr>
+        <p:cNvPr id="1" name=""/>
+        <p:cNvGrpSpPr/>
+        <p:nvPr/>
+      </p:nvGrpSpPr>
+      <p:grpSpPr>
+        <a:xfrm>
+          <a:off x="0" y="0"/>
+          <a:ext cx="0" cy="0"/>
+          <a:chOff x="0" y="0"/>
+          <a:chExt cx="0" cy="0"/>
+        </a:xfrm>
+      </p:grpSpPr>
+      <p:sp>
+        <p:nvSpPr>
+          <p:cNvPr id="4" name="Slide Number Placeholder 3"/>
+          <p:cNvSpPr>
+            <a:spLocks noGrp="1"/>
+          </p:cNvSpPr>
+          <p:nvPr>
+            <p:ph type="sldNum" sz="quarter" idx="10"/>
+          </p:nvPr>
+        </p:nvSpPr>
+        <p:spPr/>
+        <p:txBody>
+          <a:bodyPr/>
+          <a:lstStyle/>
+          <a:p>
+            <a:fld id="{4EACBA47-91FC-4F0F-98EF-AF8B449ABA17}" type="slidenum">
+              <a:rPr lang="nl-NL" noProof="0" smtClean="0"/>
+              <a:pPr/>
+              <a:t>9</a:t>
+            </a:fld>
+            <a:endParaRPr lang="nl-NL" noProof="0" dirty="0"/>
+          </a:p>
+        </p:txBody>
+      </p:sp>
+      <p:sp>
+        <p:nvSpPr>
+          <p:cNvPr id="3" name="Footer Placeholder 2"/>
+          <p:cNvSpPr>
+            <a:spLocks noGrp="1"/>
+          </p:cNvSpPr>
+          <p:nvPr>
+            <p:ph type="ftr" sz="quarter" idx="11"/>
+          </p:nvPr>
+        </p:nvSpPr>
+        <p:spPr>
+          <a:xfrm>
+            <a:off x="1884624" y="4692511"/>
+            <a:ext cx="6621144" cy="192360"/>
+          </a:xfrm>
+        </p:spPr>
+        <p:txBody>
+          <a:bodyPr/>
+          <a:lstStyle/>
+          <a:p>
+            <a:r>
+              <a:rPr lang="nl-NL" dirty="0" err="1"/>
+              <a:t>Akka,Net</a:t>
+            </a:r>
+            <a:r>
+              <a:rPr lang="nl-NL" dirty="0"/>
+              <a:t> Pizza Sessie</a:t>
+            </a:r>
+          </a:p>
+        </p:txBody>
+      </p:sp>
+      <p:sp>
+        <p:nvSpPr>
+          <p:cNvPr id="2" name="Title 1"/>
+          <p:cNvSpPr>
+            <a:spLocks noGrp="1"/>
+          </p:cNvSpPr>
+          <p:nvPr>
+            <p:ph type="title"/>
+          </p:nvPr>
+        </p:nvSpPr>
+        <p:spPr>
+          <a:xfrm>
+            <a:off x="285294" y="129454"/>
+            <a:ext cx="8460000" cy="685800"/>
+          </a:xfrm>
+        </p:spPr>
+        <p:txBody>
+          <a:bodyPr/>
+          <a:lstStyle/>
+          <a:p>
+            <a:r>
+              <a:rPr lang="nl-NL" dirty="0" smtClean="0"/>
+              <a:t>Demo</a:t>
+            </a:r>
+            <a:endParaRPr lang="nl-NL" dirty="0"/>
+          </a:p>
+        </p:txBody>
+      </p:sp>
+      <p:sp>
+        <p:nvSpPr>
+          <p:cNvPr id="5" name="Content Placeholder 2"/>
+          <p:cNvSpPr txBox="1">
+            <a:spLocks/>
+          </p:cNvSpPr>
+          <p:nvPr/>
+        </p:nvSpPr>
+        <p:spPr>
+          <a:xfrm>
+            <a:off x="246228" y="1122560"/>
+            <a:ext cx="10058400" cy="4023360"/>
+          </a:xfrm>
+          <a:prstGeom prst="rect">
+            <a:avLst/>
+          </a:prstGeom>
+        </p:spPr>
+        <p:txBody>
+          <a:bodyPr>
+            <a:normAutofit/>
+          </a:bodyPr>
+          <a:lstStyle>
+            <a:lvl1pPr marL="351000" indent="-351000" algn="l" defTabSz="685800" rtl="0" eaLnBrk="1" latinLnBrk="0" hangingPunct="1">
+              <a:lnSpc>
+                <a:spcPts val="2000"/>
+              </a:lnSpc>
+              <a:spcBef>
+                <a:spcPts val="0"/>
+              </a:spcBef>
+              <a:buFont typeface="Wingdings 3" pitchFamily="18" charset="2"/>
+              <a:buChar char=""/>
+              <a:tabLst/>
+              <a:defRPr sz="1800" b="1" kern="1200">
+                <a:solidFill>
+                  <a:schemeClr val="tx1"/>
+                </a:solidFill>
+                <a:latin typeface="+mn-lt"/>
+                <a:ea typeface="+mn-ea"/>
+                <a:cs typeface="+mn-cs"/>
+              </a:defRPr>
+            </a:lvl1pPr>
+            <a:lvl2pPr marL="675000" indent="-350044" algn="l" defTabSz="740569" rtl="0" eaLnBrk="1" latinLnBrk="0" hangingPunct="1">
+              <a:lnSpc>
+                <a:spcPts val="2000"/>
+              </a:lnSpc>
+              <a:spcBef>
+                <a:spcPts val="0"/>
+              </a:spcBef>
+              <a:buFont typeface="Wingdings 3" pitchFamily="18" charset="2"/>
+              <a:buChar char=""/>
+              <a:tabLst/>
+              <a:defRPr sz="1800" b="1" kern="1200">
+                <a:solidFill>
+                  <a:schemeClr val="tx1"/>
+                </a:solidFill>
+                <a:latin typeface="+mn-lt"/>
+                <a:ea typeface="+mn-ea"/>
+                <a:cs typeface="+mn-cs"/>
+              </a:defRPr>
+            </a:lvl2pPr>
+            <a:lvl3pPr marL="1010841" indent="-350044" algn="l" defTabSz="740569" rtl="0" eaLnBrk="1" latinLnBrk="0" hangingPunct="1">
+              <a:lnSpc>
+                <a:spcPts val="2000"/>
+              </a:lnSpc>
+              <a:spcBef>
+                <a:spcPts val="0"/>
+              </a:spcBef>
+              <a:buFont typeface="Century Gothic" pitchFamily="34" charset="0"/>
+              <a:buChar char="•"/>
+              <a:tabLst/>
+              <a:defRPr sz="1800" b="1" kern="1200">
+                <a:solidFill>
+                  <a:schemeClr val="tx1"/>
+                </a:solidFill>
+                <a:latin typeface="+mn-lt"/>
+                <a:ea typeface="+mn-ea"/>
+                <a:cs typeface="+mn-cs"/>
+              </a:defRPr>
+            </a:lvl3pPr>
+            <a:lvl4pPr marL="1345406" indent="-350044" algn="l" defTabSz="685800" rtl="0" eaLnBrk="1" latinLnBrk="0" hangingPunct="1">
+              <a:lnSpc>
+                <a:spcPts val="1800"/>
+              </a:lnSpc>
+              <a:spcBef>
+                <a:spcPts val="0"/>
+              </a:spcBef>
+              <a:buFont typeface="Century Gothic" pitchFamily="34" charset="0"/>
+              <a:buChar char="•"/>
+              <a:defRPr sz="1400" b="1" kern="1200">
+                <a:solidFill>
+                  <a:schemeClr val="tx1"/>
+                </a:solidFill>
+                <a:latin typeface="+mn-lt"/>
+                <a:ea typeface="+mn-ea"/>
+                <a:cs typeface="+mn-cs"/>
+              </a:defRPr>
+            </a:lvl4pPr>
+            <a:lvl5pPr marL="1687116" indent="-350044" algn="l" defTabSz="501254" rtl="0" eaLnBrk="1" latinLnBrk="0" hangingPunct="1">
+              <a:lnSpc>
+                <a:spcPts val="1800"/>
+              </a:lnSpc>
+              <a:spcBef>
+                <a:spcPts val="0"/>
+              </a:spcBef>
+              <a:buFont typeface="Century Gothic" pitchFamily="34" charset="0"/>
+              <a:buChar char="•"/>
+              <a:defRPr sz="1400" b="1" kern="1200">
+                <a:solidFill>
+                  <a:schemeClr val="tx1"/>
+                </a:solidFill>
+                <a:latin typeface="+mn-lt"/>
+                <a:ea typeface="+mn-ea"/>
+                <a:cs typeface="+mn-cs"/>
+              </a:defRPr>
+            </a:lvl5pPr>
+            <a:lvl6pPr marL="1885950" indent="-171450" algn="l" defTabSz="685800" rtl="0" eaLnBrk="1" latinLnBrk="0" hangingPunct="1">
+              <a:spcBef>
+                <a:spcPct val="20000"/>
+              </a:spcBef>
+              <a:buFont typeface="Arial" pitchFamily="34" charset="0"/>
+              <a:buChar char="•"/>
+              <a:defRPr sz="1500" kern="1200">
+                <a:solidFill>
+                  <a:schemeClr val="tx1"/>
+                </a:solidFill>
+                <a:latin typeface="+mn-lt"/>
+                <a:ea typeface="+mn-ea"/>
+                <a:cs typeface="+mn-cs"/>
+              </a:defRPr>
+            </a:lvl6pPr>
+            <a:lvl7pPr marL="2228850" indent="-171450" algn="l" defTabSz="685800" rtl="0" eaLnBrk="1" latinLnBrk="0" hangingPunct="1">
+              <a:spcBef>
+                <a:spcPct val="20000"/>
+              </a:spcBef>
+              <a:buFont typeface="Arial" pitchFamily="34" charset="0"/>
+              <a:buChar char="•"/>
+              <a:defRPr sz="1500" kern="1200">
+                <a:solidFill>
+                  <a:schemeClr val="tx1"/>
+                </a:solidFill>
+                <a:latin typeface="+mn-lt"/>
+                <a:ea typeface="+mn-ea"/>
+                <a:cs typeface="+mn-cs"/>
+              </a:defRPr>
+            </a:lvl7pPr>
+            <a:lvl8pPr marL="2571750" indent="-171450" algn="l" defTabSz="685800" rtl="0" eaLnBrk="1" latinLnBrk="0" hangingPunct="1">
+              <a:spcBef>
+                <a:spcPct val="20000"/>
+              </a:spcBef>
+              <a:buFont typeface="Arial" pitchFamily="34" charset="0"/>
+              <a:buChar char="•"/>
+              <a:defRPr sz="1500" kern="1200">
+                <a:solidFill>
+                  <a:schemeClr val="tx1"/>
+                </a:solidFill>
+                <a:latin typeface="+mn-lt"/>
+                <a:ea typeface="+mn-ea"/>
+                <a:cs typeface="+mn-cs"/>
+              </a:defRPr>
+            </a:lvl8pPr>
+            <a:lvl9pPr marL="2914650" indent="-171450" algn="l" defTabSz="685800" rtl="0" eaLnBrk="1" latinLnBrk="0" hangingPunct="1">
+              <a:spcBef>
+                <a:spcPct val="20000"/>
+              </a:spcBef>
+              <a:buFont typeface="Arial" pitchFamily="34" charset="0"/>
+              <a:buChar char="•"/>
+              <a:defRPr sz="1500" kern="1200">
+                <a:solidFill>
+                  <a:schemeClr val="tx1"/>
+                </a:solidFill>
+                <a:latin typeface="+mn-lt"/>
+                <a:ea typeface="+mn-ea"/>
+                <a:cs typeface="+mn-cs"/>
+              </a:defRPr>
+            </a:lvl9pPr>
+          </a:lstStyle>
+          <a:p>
+            <a:pPr fontAlgn="ctr"/>
+            <a:r>
+              <a:rPr lang="en-GB" dirty="0" smtClean="0"/>
+              <a:t>Chat Server</a:t>
+            </a:r>
+          </a:p>
+          <a:p>
+            <a:pPr fontAlgn="ctr"/>
+            <a:r>
+              <a:rPr lang="en-GB" dirty="0"/>
+              <a:t>HOCON</a:t>
+            </a:r>
+            <a:endParaRPr lang="en-GB" dirty="0" smtClean="0"/>
+          </a:p>
+          <a:p>
+            <a:pPr fontAlgn="ctr"/>
+            <a:r>
+              <a:rPr lang="en-GB" dirty="0" smtClean="0"/>
+              <a:t>Remote </a:t>
+            </a:r>
+            <a:r>
+              <a:rPr lang="en-GB" dirty="0" err="1" smtClean="0"/>
+              <a:t>deployement</a:t>
+            </a:r>
+            <a:endParaRPr lang="en-GB" dirty="0" smtClean="0"/>
+          </a:p>
+          <a:p>
+            <a:pPr fontAlgn="ctr"/>
+            <a:r>
+              <a:rPr lang="en-GB" dirty="0" smtClean="0"/>
+              <a:t>Error handling</a:t>
+            </a:r>
+          </a:p>
+          <a:p>
+            <a:pPr fontAlgn="ctr"/>
+            <a:r>
+              <a:rPr lang="en-GB" dirty="0" smtClean="0"/>
+              <a:t>Hooking up with website</a:t>
+            </a:r>
+            <a:endParaRPr lang="en-GB" dirty="0"/>
+          </a:p>
+          <a:p>
+            <a:pPr fontAlgn="ctr"/>
+            <a:endParaRPr lang="en-GB" dirty="0"/>
+          </a:p>
+          <a:p>
+            <a:pPr marL="0" indent="0">
+              <a:lnSpc>
+                <a:spcPct val="100000"/>
+              </a:lnSpc>
+              <a:buNone/>
+            </a:pPr>
+            <a:endParaRPr lang="nl-NL" dirty="0"/>
+          </a:p>
+          <a:p>
+            <a:pPr marL="0" indent="0">
+              <a:lnSpc>
+                <a:spcPct val="100000"/>
+              </a:lnSpc>
+              <a:buNone/>
+            </a:pPr>
+            <a:endParaRPr lang="nl-NL" dirty="0" smtClean="0"/>
+          </a:p>
+          <a:p>
+            <a:pPr>
+              <a:lnSpc>
+                <a:spcPct val="100000"/>
+              </a:lnSpc>
+              <a:buFont typeface="Wingdings" panose="05000000000000000000" pitchFamily="2" charset="2"/>
+              <a:buChar char="Ø"/>
+            </a:pPr>
+            <a:endParaRPr lang="nl-NL" dirty="0"/>
+          </a:p>
+          <a:p>
+            <a:pPr marL="0" indent="0">
+              <a:lnSpc>
+                <a:spcPct val="100000"/>
+              </a:lnSpc>
+              <a:buNone/>
+            </a:pPr>
+            <a:endParaRPr lang="nl-NL" dirty="0"/>
+          </a:p>
+        </p:txBody>
+      </p:sp>
+    </p:spTree>
+    <p:extLst>
+      <p:ext uri="{BB962C8B-B14F-4D97-AF65-F5344CB8AC3E}">
+        <p14:creationId xmlns:p14="http://schemas.microsoft.com/office/powerpoint/2010/main" val="3020475184"/>
+      </p:ext>
+    </p:extLst>
+  </p:cSld>
+  <p:clrMapOvr>
+    <a:masterClrMapping/>
+  </p:clrMapOvr>
+  <p:timing>
+    <p:tnLst>
+      <p:par>
+        <p:cTn id="1" dur="indefinite" restart="never" nodeType="tmRoot"/>
+      </p:par>
+    </p:tnLst>
+  </p:timing>
 </p:sld>
 </file>
 

</xml_diff>